<commit_message>
Mouse Function Tutorial Renewal
- Each PPT data update

- Change the mouse cursor image

- Delete and add resource data
</commit_message>
<xml_diff>
--- a/Assets/Mouse Function/PPT Data/Mouse Example.pptx
+++ b/Assets/Mouse Function/PPT Data/Mouse Example.pptx
@@ -2,7 +2,7 @@
 <file path=ppt/presentation.xml><?xml version="1.0" encoding="utf-8"?>
 <p:presentation xmlns:a="http://schemas.openxmlformats.org/drawingml/2006/main" xmlns:r="http://schemas.openxmlformats.org/officeDocument/2006/relationships" xmlns:p="http://schemas.openxmlformats.org/presentationml/2006/main" xmlns:p14="http://schemas.microsoft.com/office/powerpoint/2010/main" saveSubsetFonts="1" firstSlideNum="0">
   <p:sldMasterIdLst>
-    <p:sldMasterId id="2147485544" r:id="rId12"/>
+    <p:sldMasterId id="2147485548" r:id="rId12"/>
   </p:sldMasterIdLst>
   <p:notesMasterIdLst>
     <p:notesMasterId r:id="rId14"/>
@@ -15,15 +15,11 @@
     <p:sldId id="281" r:id="rId20"/>
     <p:sldId id="283" r:id="rId21"/>
     <p:sldId id="285" r:id="rId22"/>
-    <p:sldId id="286" r:id="rId23"/>
-    <p:sldId id="287" r:id="rId24"/>
-    <p:sldId id="288" r:id="rId25"/>
-    <p:sldId id="282" r:id="rId26"/>
-    <p:sldId id="289" r:id="rId27"/>
-    <p:sldId id="284" r:id="rId28"/>
-    <p:sldId id="290" r:id="rId29"/>
-    <p:sldId id="291" r:id="rId30"/>
-    <p:sldId id="292" r:id="rId31"/>
+    <p:sldId id="287" r:id="rId23"/>
+    <p:sldId id="288" r:id="rId24"/>
+    <p:sldId id="289" r:id="rId25"/>
+    <p:sldId id="290" r:id="rId26"/>
+    <p:sldId id="291" r:id="rId27"/>
   </p:sldIdLst>
   <p:sldSz cx="12192000" cy="6858000"/>
   <p:notesSz cx="6858000" cy="9144000"/>
@@ -5958,7 +5954,7 @@
                 <a:latin typeface="나눔바른고딕" charset="0"/>
                 <a:ea typeface="나눔바른고딕" charset="0"/>
               </a:rPr>
-              <a:t>열</a:t>
+              <a:t>열한</a:t>
             </a:r>
             <a:r>
               <a:rPr lang="ko-KR" sz="2500" b="1">
@@ -5990,8 +5986,8 @@
         </p:nvSpPr>
         <p:spPr>
           <a:xfrm>
-            <a:off x="1238885" y="3859530"/>
-            <a:ext cx="4140200" cy="2338705"/>
+            <a:off x="1247775" y="4084955"/>
+            <a:ext cx="4139565" cy="2061845"/>
           </a:xfrm>
           <a:prstGeom prst="rect"/>
           <a:noFill/>
@@ -6018,7 +6014,17 @@
                 <a:latin typeface="맑은 고딕" charset="0"/>
                 <a:ea typeface="맑은 고딕" charset="0"/>
               </a:rPr>
-              <a:t>30</a:t>
+              <a:t>3</a:t>
+            </a:r>
+            <a:r>
+              <a:rPr lang="ko-KR" sz="2000" b="1">
+                <a:solidFill>
+                  <a:srgbClr val="0611F2"/>
+                </a:solidFill>
+                <a:latin typeface="맑은 고딕" charset="0"/>
+                <a:ea typeface="맑은 고딕" charset="0"/>
+              </a:rPr>
+              <a:t>2</a:t>
             </a:r>
             <a:r>
               <a:rPr sz="2000" b="1">
@@ -6035,7 +6041,49 @@
                 <a:latin typeface="맑은 고딕" charset="0"/>
                 <a:ea typeface="맑은 고딕" charset="0"/>
               </a:rPr>
-              <a:t>그런 다음 Mouse 스크립트에서 Rigidbody 변수와 GameObject 변수 그리고 VideoPlayer 변수를 선언합니다.</a:t>
+              <a:t>그리고 OnMouseDown( ) 함수를 선언한 다음 state 오브젝트</a:t>
+            </a:r>
+            <a:r>
+              <a:rPr lang="ko-KR" sz="1800">
+                <a:latin typeface="맑은 고딕" charset="0"/>
+                <a:ea typeface="맑은 고딕" charset="0"/>
+              </a:rPr>
+              <a:t>가</a:t>
+            </a:r>
+            <a:r>
+              <a:rPr lang="ko-KR" sz="1800">
+                <a:latin typeface="맑은 고딕" charset="0"/>
+                <a:ea typeface="맑은 고딕" charset="0"/>
+              </a:rPr>
+              <a:t> 활성화</a:t>
+            </a:r>
+            <a:r>
+              <a:rPr lang="ko-KR" sz="1800">
+                <a:latin typeface="맑은 고딕" charset="0"/>
+                <a:ea typeface="맑은 고딕" charset="0"/>
+              </a:rPr>
+              <a:t>되</a:t>
+            </a:r>
+            <a:r>
+              <a:rPr lang="ko-KR" sz="1800">
+                <a:latin typeface="맑은 고딕" charset="0"/>
+                <a:ea typeface="맑은 고딕" charset="0"/>
+              </a:rPr>
+              <a:t>도록 </a:t>
+            </a:r>
+            <a:r>
+              <a:rPr lang="ko-KR" sz="1800">
+                <a:latin typeface="맑은 고딕" charset="0"/>
+                <a:ea typeface="맑은 고딕" charset="0"/>
+              </a:rPr>
+              <a:t>설정</a:t>
+            </a:r>
+            <a:r>
+              <a:rPr lang="ko-KR" sz="1800">
+                <a:latin typeface="맑은 고딕" charset="0"/>
+                <a:ea typeface="맑은 고딕" charset="0"/>
+              </a:rPr>
+              <a:t>합니다.</a:t>
             </a:r>
             <a:endParaRPr lang="ko-KR" altLang="en-US" sz="1800">
               <a:latin typeface="맑은 고딕" charset="0"/>
@@ -6062,7 +6110,7 @@
                 <a:latin typeface="맑은 고딕" charset="0"/>
                 <a:ea typeface="맑은 고딕" charset="0"/>
               </a:rPr>
-              <a:t>그러고 나서 LayerMask 변수와 RaycastHit 변수 그리고 boolean 변수를 선언합니다.</a:t>
+              <a:t>그런 다음 RigidBody가 물리적인 영향을 받지 않도록 isKinematic을 활성화합니다.</a:t>
             </a:r>
             <a:endParaRPr lang="ko-KR" altLang="en-US" sz="1800">
               <a:latin typeface="맑은 고딕" charset="0"/>
@@ -6071,100 +6119,9 @@
           </a:p>
         </p:txBody>
       </p:sp>
-      <p:sp>
-        <p:nvSpPr>
-          <p:cNvPr id="94" name="텍스트 상자 58"/>
-          <p:cNvSpPr txBox="1">
-            <a:spLocks/>
-          </p:cNvSpPr>
-          <p:nvPr/>
-        </p:nvSpPr>
-        <p:spPr>
-          <a:xfrm>
-            <a:off x="6814820" y="3861435"/>
-            <a:ext cx="4131945" cy="2338705"/>
-          </a:xfrm>
-          <a:prstGeom prst="rect"/>
-          <a:noFill/>
-          <a:ln w="0">
-            <a:noFill/>
-            <a:prstDash/>
-          </a:ln>
-        </p:spPr>
-        <p:txBody>
-          <a:bodyPr wrap="square" lIns="89535" tIns="46355" rIns="89535" bIns="46355" numCol="1" vert="horz" anchor="t">
-            <a:spAutoFit/>
-          </a:bodyPr>
-          <a:lstStyle/>
-          <a:p>
-            <a:pPr marL="0" indent="0" rtl="0" algn="l" defTabSz="914400" eaLnBrk="1" latinLnBrk="0" hangingPunct="1">
-              <a:buFontTx/>
-              <a:buNone/>
-            </a:pPr>
-            <a:r>
-              <a:rPr lang="ko-KR" sz="2000" b="1">
-                <a:solidFill>
-                  <a:srgbClr val="0611F2"/>
-                </a:solidFill>
-                <a:latin typeface="맑은 고딕" charset="0"/>
-                <a:ea typeface="맑은 고딕" charset="0"/>
-              </a:rPr>
-              <a:t>31</a:t>
-            </a:r>
-            <a:r>
-              <a:rPr sz="2000" b="1">
-                <a:solidFill>
-                  <a:srgbClr val="0611F2"/>
-                </a:solidFill>
-                <a:latin typeface="맑은 고딕" charset="0"/>
-                <a:ea typeface="맑은 고딕" charset="0"/>
-              </a:rPr>
-              <a:t>. </a:t>
-            </a:r>
-            <a:r>
-              <a:rPr lang="ko-KR" sz="1800">
-                <a:latin typeface="맑은 고딕" charset="0"/>
-                <a:ea typeface="맑은 고딕" charset="0"/>
-              </a:rPr>
-              <a:t>이제 Update( ) 함수에서 ray에 대한 정보를 설정한 다음 마우스로 선택했을 때 ray와 특정한 layer를 가진 오브젝트가 충돌했는지 검사합니다.</a:t>
-            </a:r>
-            <a:endParaRPr lang="ko-KR" altLang="en-US" sz="1800">
-              <a:latin typeface="맑은 고딕" charset="0"/>
-              <a:ea typeface="맑은 고딕" charset="0"/>
-            </a:endParaRPr>
-          </a:p>
-          <a:p>
-            <a:pPr marL="0" indent="0" rtl="0" algn="l" defTabSz="914400" eaLnBrk="1" latinLnBrk="0" hangingPunct="1">
-              <a:buFontTx/>
-              <a:buNone/>
-            </a:pPr>
-            <a:endParaRPr lang="ko-KR" altLang="en-US" sz="1800">
-              <a:latin typeface="맑은 고딕" charset="0"/>
-              <a:ea typeface="맑은 고딕" charset="0"/>
-            </a:endParaRPr>
-          </a:p>
-          <a:p>
-            <a:pPr marL="0" indent="0" rtl="0" algn="l" defTabSz="914400" eaLnBrk="1" latinLnBrk="0" hangingPunct="1">
-              <a:buFontTx/>
-              <a:buNone/>
-            </a:pPr>
-            <a:r>
-              <a:rPr lang="ko-KR" sz="1800">
-                <a:latin typeface="맑은 고딕" charset="0"/>
-                <a:ea typeface="맑은 고딕" charset="0"/>
-              </a:rPr>
-              <a:t>그다음 충돌이 되었다면 boolean 변수에 따라 video를 실행하고 정지할 수 있도록 설정합니다.</a:t>
-            </a:r>
-            <a:endParaRPr lang="ko-KR" altLang="en-US" sz="1800">
-              <a:latin typeface="맑은 고딕" charset="0"/>
-              <a:ea typeface="맑은 고딕" charset="0"/>
-            </a:endParaRPr>
-          </a:p>
-        </p:txBody>
-      </p:sp>
       <p:pic>
         <p:nvPicPr>
-          <p:cNvPr id="96" name="그림 62"/>
+          <p:cNvPr id="98" name="그림 68"/>
           <p:cNvPicPr>
             <a:picLocks noChangeAspect="1"/>
           </p:cNvPicPr>
@@ -6184,8 +6141,8 @@
         </p:blipFill>
         <p:spPr>
           <a:xfrm rot="0">
-            <a:off x="1235710" y="1437640"/>
-            <a:ext cx="4142740" cy="2312670"/>
+            <a:off x="1236345" y="1445895"/>
+            <a:ext cx="4150360" cy="2468880"/>
           </a:xfrm>
           <a:prstGeom prst="roundRect"/>
           <a:solidFill>
@@ -6195,7 +6152,7 @@
       </p:pic>
       <p:pic>
         <p:nvPicPr>
-          <p:cNvPr id="97" name="그림 65"/>
+          <p:cNvPr id="99" name="그림 75"/>
           <p:cNvPicPr>
             <a:picLocks noChangeAspect="1"/>
           </p:cNvPicPr>
@@ -6215,8 +6172,8 @@
         </p:blipFill>
         <p:spPr>
           <a:xfrm rot="0">
-            <a:off x="6814820" y="1437640"/>
-            <a:ext cx="4139565" cy="2312670"/>
+            <a:off x="6814820" y="1445895"/>
+            <a:ext cx="4139565" cy="2479040"/>
           </a:xfrm>
           <a:prstGeom prst="roundRect"/>
           <a:solidFill>
@@ -6224,58 +6181,18 @@
           </a:solidFill>
         </p:spPr>
       </p:pic>
-    </p:spTree>
-  </p:cSld>
-  <p:clrMapOvr>
-    <a:masterClrMapping/>
-  </p:clrMapOvr>
-  <mc:AlternateContent xmlns:mc="http://schemas.openxmlformats.org/markup-compatibility/2006">
-    <mc:Choice xmlns:p14="http://schemas.microsoft.com/office/powerpoint/2010/main" Requires="p14">
-      <p:transition spd="slow" p14:dur="1000"/>
-    </mc:Choice>
-    <mc:Fallback>
-      <p:transition spd="slow"/>
-    </mc:Fallback>
-  </mc:AlternateContent>
-  <p:timing>
-    <p:tnLst>
-      <p:par>
-        <p:cTn id="1" dur="indefinite" restart="never" nodeType="tmRoot"/>
-      </p:par>
-    </p:tnLst>
-  </p:timing>
-</p:sld>
-</file>
-
-<file path=ppt/slides/slide11.xml><?xml version="1.0" encoding="utf-8"?>
-<p:sld xmlns:a="http://schemas.openxmlformats.org/drawingml/2006/main" xmlns:r="http://schemas.openxmlformats.org/officeDocument/2006/relationships" xmlns:p="http://schemas.openxmlformats.org/presentationml/2006/main" xmlns:p14="http://schemas.microsoft.com/office/powerpoint/2010/main">
-  <p:cSld>
-    <p:spTree>
-      <p:nvGrpSpPr>
-        <p:cNvPr id="1" name=""/>
-        <p:cNvGrpSpPr/>
-        <p:nvPr/>
-      </p:nvGrpSpPr>
-      <p:grpSpPr>
-        <a:xfrm>
-          <a:off x="0" y="0"/>
-          <a:ext cx="0" cy="0"/>
-          <a:chOff x="0" y="0"/>
-          <a:chExt cx="0" cy="0"/>
-        </a:xfrm>
-      </p:grpSpPr>
       <p:sp>
         <p:nvSpPr>
-          <p:cNvPr id="2" name="Rect 0"/>
+          <p:cNvPr id="100" name="텍스트 상자 78"/>
           <p:cNvSpPr txBox="1">
             <a:spLocks/>
           </p:cNvSpPr>
           <p:nvPr/>
         </p:nvSpPr>
         <p:spPr>
-          <a:xfrm rot="0">
-            <a:off x="4658995" y="450215"/>
-            <a:ext cx="2877185" cy="478155"/>
+          <a:xfrm>
+            <a:off x="6809105" y="4087495"/>
+            <a:ext cx="4137660" cy="2061845"/>
           </a:xfrm>
           <a:prstGeom prst="rect"/>
           <a:noFill/>
@@ -6290,367 +6207,73 @@
           </a:bodyPr>
           <a:lstStyle/>
           <a:p>
-            <a:pPr marL="0" indent="0" rtl="0" algn="ctr" defTabSz="914400" eaLnBrk="1" latinLnBrk="0" hangingPunct="1">
-              <a:buFontTx/>
-              <a:buNone/>
-            </a:pPr>
-            <a:r>
-              <a:rPr lang="ko-KR" sz="2500" b="1">
-                <a:solidFill>
-                  <a:schemeClr val="tx1"/>
-                </a:solidFill>
-                <a:latin typeface="나눔바른고딕" charset="0"/>
-                <a:ea typeface="나눔바른고딕" charset="0"/>
-              </a:rPr>
-              <a:t>RayCast</a:t>
-            </a:r>
-            <a:endParaRPr lang="ko-KR" altLang="en-US" sz="2500" b="1">
-              <a:solidFill>
-                <a:schemeClr val="tx1"/>
-              </a:solidFill>
-              <a:latin typeface="나눔바른고딕" charset="0"/>
-              <a:ea typeface="나눔바른고딕" charset="0"/>
-            </a:endParaRPr>
-          </a:p>
-        </p:txBody>
-      </p:sp>
-      <p:sp>
-        <p:nvSpPr>
-          <p:cNvPr id="61" name="텍스트 상자 4"/>
-          <p:cNvSpPr txBox="1">
-            <a:spLocks/>
-          </p:cNvSpPr>
-          <p:nvPr/>
-        </p:nvSpPr>
-        <p:spPr>
-          <a:xfrm rot="0">
-            <a:off x="1229995" y="1454785"/>
-            <a:ext cx="4132580" cy="923925"/>
-          </a:xfrm>
-          <a:prstGeom prst="rect"/>
-          <a:noFill/>
-          <a:ln w="0">
-            <a:noFill/>
-            <a:prstDash/>
-          </a:ln>
-        </p:spPr>
-        <p:txBody>
-          <a:bodyPr wrap="square" lIns="89535" tIns="46355" rIns="89535" bIns="46355" vert="horz" anchor="t">
-            <a:spAutoFit/>
-          </a:bodyPr>
-          <a:lstStyle/>
-          <a:p>
             <a:pPr marL="0" indent="0" rtl="0" algn="l" defTabSz="914400" eaLnBrk="1" latinLnBrk="0" hangingPunct="1">
               <a:buFontTx/>
               <a:buNone/>
             </a:pPr>
             <a:r>
-              <a:rPr sz="1800">
-                <a:latin typeface="맑은 고딕" charset="0"/>
-                <a:ea typeface="맑은 고딕" charset="0"/>
-              </a:rPr>
-              <a:t>Physics.Raycast( ) 함수는 3</a:t>
-            </a:r>
-            <a:r>
-              <a:rPr sz="1800">
-                <a:latin typeface="맑은 고딕" charset="0"/>
-                <a:ea typeface="맑은 고딕" charset="0"/>
-              </a:rPr>
-              <a:t> </a:t>
-            </a:r>
-            <a:r>
-              <a:rPr sz="1800">
-                <a:latin typeface="맑은 고딕" charset="0"/>
-                <a:ea typeface="맑은 고딕" charset="0"/>
-              </a:rPr>
-              <a:t>차원 공간에서 </a:t>
+              <a:rPr lang="ko-KR" sz="2000" b="1">
+                <a:solidFill>
+                  <a:srgbClr val="0611F2"/>
+                </a:solidFill>
+                <a:latin typeface="맑은 고딕" charset="0"/>
+                <a:ea typeface="맑은 고딕" charset="0"/>
+              </a:rPr>
+              <a:t>3</a:t>
+            </a:r>
+            <a:r>
+              <a:rPr lang="ko-KR" sz="2000" b="1">
+                <a:solidFill>
+                  <a:srgbClr val="0611F2"/>
+                </a:solidFill>
+                <a:latin typeface="맑은 고딕" charset="0"/>
+                <a:ea typeface="맑은 고딕" charset="0"/>
+              </a:rPr>
+              <a:t>3</a:t>
+            </a:r>
+            <a:r>
+              <a:rPr sz="2000" b="1">
+                <a:solidFill>
+                  <a:srgbClr val="0611F2"/>
+                </a:solidFill>
+                <a:latin typeface="맑은 고딕" charset="0"/>
+                <a:ea typeface="맑은 고딕" charset="0"/>
+              </a:rPr>
+              <a:t>. </a:t>
             </a:r>
             <a:r>
               <a:rPr lang="ko-KR" sz="1800">
                 <a:latin typeface="맑은 고딕" charset="0"/>
                 <a:ea typeface="맑은 고딕" charset="0"/>
               </a:rPr>
-              <a:t>특정한</a:t>
-            </a:r>
-            <a:r>
-              <a:rPr sz="1800">
-                <a:latin typeface="맑은 고딕" charset="0"/>
-                <a:ea typeface="맑은 고딕" charset="0"/>
-              </a:rPr>
-              <a:t> 방향으로 광선을 발사하</a:t>
-            </a:r>
-            <a:r>
-              <a:rPr lang="ko-KR" sz="1800">
-                <a:latin typeface="맑은 고딕" charset="0"/>
-                <a:ea typeface="맑은 고딕" charset="0"/>
-              </a:rPr>
-              <a:t>는 함수입니다.</a:t>
+              <a:t>그러고 나서 OnMouseDrag( ) 함수를 선언하고 마우스 위치 정보를 설정합니다.</a:t>
             </a:r>
             <a:endParaRPr lang="ko-KR" altLang="en-US" sz="1800">
               <a:latin typeface="맑은 고딕" charset="0"/>
               <a:ea typeface="맑은 고딕" charset="0"/>
             </a:endParaRPr>
           </a:p>
-        </p:txBody>
-      </p:sp>
-      <p:sp>
-        <p:nvSpPr>
-          <p:cNvPr id="62" name="텍스트 상자 5"/>
-          <p:cNvSpPr txBox="1">
-            <a:spLocks/>
-          </p:cNvSpPr>
-          <p:nvPr/>
-        </p:nvSpPr>
-        <p:spPr>
-          <a:xfrm rot="0">
-            <a:off x="1230630" y="5034915"/>
-            <a:ext cx="4140200" cy="1200785"/>
-          </a:xfrm>
-          <a:prstGeom prst="rect"/>
-          <a:noFill/>
-          <a:ln w="0">
-            <a:noFill/>
-            <a:prstDash/>
-          </a:ln>
-        </p:spPr>
-        <p:txBody>
-          <a:bodyPr wrap="square" lIns="89535" tIns="46355" rIns="89535" bIns="46355" vert="horz" anchor="t">
-            <a:spAutoFit/>
-          </a:bodyPr>
-          <a:lstStyle/>
           <a:p>
             <a:pPr marL="0" indent="0" rtl="0" algn="l" defTabSz="914400" eaLnBrk="1" latinLnBrk="0" hangingPunct="1">
               <a:buFontTx/>
               <a:buNone/>
             </a:pPr>
-            <a:r>
-              <a:rPr sz="1800">
-                <a:latin typeface="맑은 고딕" charset="0"/>
-                <a:ea typeface="맑은 고딕" charset="0"/>
-              </a:rPr>
-              <a:t>Physics.Raycast( ) 함수</a:t>
-            </a:r>
-            <a:r>
-              <a:rPr lang="ko-KR" sz="1800">
-                <a:latin typeface="맑은 고딕" charset="0"/>
-                <a:ea typeface="맑은 고딕" charset="0"/>
-              </a:rPr>
-              <a:t>의 경우</a:t>
-            </a:r>
-            <a:r>
-              <a:rPr sz="1800">
-                <a:latin typeface="맑은 고딕" charset="0"/>
-                <a:ea typeface="맑은 고딕" charset="0"/>
-              </a:rPr>
-              <a:t> </a:t>
-            </a:r>
-            <a:r>
-              <a:rPr lang="ko-KR" sz="1800">
-                <a:latin typeface="맑은 고딕" charset="0"/>
-                <a:ea typeface="맑은 고딕" charset="0"/>
-              </a:rPr>
-              <a:t>광선과 충돌한 오브젝트는</a:t>
-            </a:r>
-            <a:r>
-              <a:rPr sz="1800">
-                <a:latin typeface="맑은 고딕" charset="0"/>
-                <a:ea typeface="맑은 고딕" charset="0"/>
-              </a:rPr>
-              <a:t> 콜라이더 컴포넌트를 가지고 있어야 </a:t>
-            </a:r>
-            <a:r>
-              <a:rPr lang="ko-KR" sz="1800">
-                <a:latin typeface="맑은 고딕" charset="0"/>
-                <a:ea typeface="맑은 고딕" charset="0"/>
-              </a:rPr>
-              <a:t>감지할 수 있습니다.</a:t>
-            </a:r>
             <a:endParaRPr lang="ko-KR" altLang="en-US" sz="1800">
               <a:latin typeface="맑은 고딕" charset="0"/>
               <a:ea typeface="맑은 고딕" charset="0"/>
             </a:endParaRPr>
           </a:p>
-        </p:txBody>
-      </p:sp>
-      <p:pic>
-        <p:nvPicPr>
-          <p:cNvPr id="63" name="그림 6"/>
-          <p:cNvPicPr>
-            <a:picLocks noChangeAspect="1"/>
-          </p:cNvPicPr>
-          <p:nvPr/>
-        </p:nvPicPr>
-        <p:blipFill rotWithShape="1">
-          <a:blip r:embed="rId5" cstate="print">
-            <a:extLst>
-              <a:ext uri="{28A0092B-C50C-407E-A947-70E740481C1C}">
-                <a14:useLocalDpi xmlns:a14="http://schemas.microsoft.com/office/drawing/2010/main" val="0"/>
-              </a:ext>
-            </a:extLst>
-          </a:blip>
-          <a:stretch>
-            <a:fillRect/>
-          </a:stretch>
-        </p:blipFill>
-        <p:spPr>
-          <a:xfrm rot="0">
-            <a:off x="1229995" y="2560320"/>
-            <a:ext cx="4140835" cy="2303145"/>
-          </a:xfrm>
-          <a:prstGeom prst="roundRect"/>
-          <a:solidFill>
-            <a:srgbClr val="EDEDED"/>
-          </a:solidFill>
-        </p:spPr>
-      </p:pic>
-      <p:pic>
-        <p:nvPicPr>
-          <p:cNvPr id="64" name="그림 25"/>
-          <p:cNvPicPr>
-            <a:picLocks noChangeAspect="1"/>
-          </p:cNvPicPr>
-          <p:nvPr/>
-        </p:nvPicPr>
-        <p:blipFill rotWithShape="1">
-          <a:blip r:embed="rId6" cstate="hqprint">
-            <a:extLst>
-              <a:ext uri="{28A0092B-C50C-407E-A947-70E740481C1C}">
-                <a14:useLocalDpi xmlns:a14="http://schemas.microsoft.com/office/drawing/2010/main"/>
-              </a:ext>
-            </a:extLst>
-          </a:blip>
-          <a:stretch>
-            <a:fillRect/>
-          </a:stretch>
-        </p:blipFill>
-        <p:spPr>
-          <a:xfrm rot="0">
-            <a:off x="6814820" y="2571750"/>
-            <a:ext cx="4148455" cy="2459990"/>
-          </a:xfrm>
-          <a:prstGeom prst="roundRect"/>
-          <a:solidFill>
-            <a:srgbClr val="EDEDED"/>
-          </a:solidFill>
-        </p:spPr>
-      </p:pic>
-      <p:sp>
-        <p:nvSpPr>
-          <p:cNvPr id="65" name="텍스트 상자 26"/>
-          <p:cNvSpPr txBox="1">
-            <a:spLocks/>
-          </p:cNvSpPr>
-          <p:nvPr/>
-        </p:nvSpPr>
-        <p:spPr>
-          <a:xfrm rot="0">
-            <a:off x="6826885" y="1463675"/>
-            <a:ext cx="4145280" cy="961390"/>
-          </a:xfrm>
-          <a:prstGeom prst="rect"/>
-          <a:noFill/>
-        </p:spPr>
-        <p:txBody>
-          <a:bodyPr wrap="square" lIns="0" tIns="0" rIns="0" bIns="0" vert="horz" anchor="t">
-            <a:noAutofit/>
-          </a:bodyPr>
-          <a:lstStyle/>
           <a:p>
             <a:pPr marL="0" indent="0" rtl="0" algn="l" defTabSz="914400" eaLnBrk="1" latinLnBrk="0" hangingPunct="1">
               <a:buFontTx/>
               <a:buNone/>
             </a:pPr>
             <a:r>
-              <a:rPr sz="1800">
-                <a:latin typeface="맑은 고딕" charset="0"/>
-                <a:ea typeface="맑은 고딕" charset="0"/>
-              </a:rPr>
-              <a:t>Physics.Raycast( )</a:t>
-            </a:r>
-            <a:r>
-              <a:rPr sz="1800">
-                <a:latin typeface="맑은 고딕" charset="0"/>
-                <a:ea typeface="맑은 고딕" charset="0"/>
-              </a:rPr>
-              <a:t> </a:t>
-            </a:r>
-            <a:r>
               <a:rPr lang="ko-KR" sz="1800">
                 <a:latin typeface="맑은 고딕" charset="0"/>
                 <a:ea typeface="맑은 고딕" charset="0"/>
               </a:rPr>
-              <a:t>함수로</a:t>
-            </a:r>
-            <a:r>
-              <a:rPr sz="1800">
-                <a:latin typeface="맑은 고딕" charset="0"/>
-                <a:ea typeface="맑은 고딕" charset="0"/>
-              </a:rPr>
-              <a:t> 특정한 Layer만 검출하여 충돌하도록 설정할 수 있습니다.</a:t>
-            </a:r>
-            <a:endParaRPr lang="ko-KR" altLang="en-US" sz="1800">
-              <a:latin typeface="맑은 고딕" charset="0"/>
-              <a:ea typeface="맑은 고딕" charset="0"/>
-            </a:endParaRPr>
-          </a:p>
-          <a:p>
-            <a:pPr marL="0" indent="0" rtl="0" algn="l" defTabSz="914400" eaLnBrk="1" latinLnBrk="0" hangingPunct="1">
-              <a:buFontTx/>
-              <a:buNone/>
-            </a:pPr>
-            <a:endParaRPr lang="ko-KR" altLang="en-US" sz="1800">
-              <a:latin typeface="맑은 고딕" charset="0"/>
-              <a:ea typeface="맑은 고딕" charset="0"/>
-            </a:endParaRPr>
-          </a:p>
-        </p:txBody>
-      </p:sp>
-      <p:sp>
-        <p:nvSpPr>
-          <p:cNvPr id="66" name="텍스트 상자 27"/>
-          <p:cNvSpPr txBox="1">
-            <a:spLocks/>
-          </p:cNvSpPr>
-          <p:nvPr/>
-        </p:nvSpPr>
-        <p:spPr>
-          <a:xfrm rot="0">
-            <a:off x="6812280" y="5274310"/>
-            <a:ext cx="4159885" cy="961390"/>
-          </a:xfrm>
-          <a:prstGeom prst="rect"/>
-          <a:noFill/>
-        </p:spPr>
-        <p:txBody>
-          <a:bodyPr wrap="square" lIns="0" tIns="0" rIns="0" bIns="0" vert="horz" anchor="t">
-            <a:noAutofit/>
-          </a:bodyPr>
-          <a:lstStyle/>
-          <a:p>
-            <a:pPr marL="0" indent="0" rtl="0" algn="l" defTabSz="914400" eaLnBrk="1" latinLnBrk="0" hangingPunct="1">
-              <a:buFontTx/>
-              <a:buNone/>
-            </a:pPr>
-            <a:r>
-              <a:rPr sz="1800">
-                <a:latin typeface="맑은 고딕" charset="0"/>
-                <a:ea typeface="맑은 고딕" charset="0"/>
-              </a:rPr>
-              <a:t>LayerMask의 경우 32 bit의 int 형으로 bit로 각각의 </a:t>
-            </a:r>
-            <a:r>
-              <a:rPr lang="ko-KR" sz="1800">
-                <a:latin typeface="맑은 고딕" charset="0"/>
-                <a:ea typeface="맑은 고딕" charset="0"/>
-              </a:rPr>
-              <a:t>Layer</a:t>
-            </a:r>
-            <a:r>
-              <a:rPr sz="1800">
-                <a:latin typeface="맑은 고딕" charset="0"/>
-                <a:ea typeface="맑은 고딕" charset="0"/>
-              </a:rPr>
-              <a:t>를 구분하여 사용합니다.</a:t>
+              <a:t>마지막으로 스크린 공간에 있는 좌표 정보를 변환하여 게임 오브젝트의 위치로 저장합니다.</a:t>
             </a:r>
             <a:endParaRPr lang="ko-KR" altLang="en-US" sz="1800">
               <a:latin typeface="맑은 고딕" charset="0"/>
@@ -6682,757 +6305,7 @@
 </p:sld>
 </file>
 
-<file path=ppt/slides/slide12.xml><?xml version="1.0" encoding="utf-8"?>
-<p:sld xmlns:a="http://schemas.openxmlformats.org/drawingml/2006/main" xmlns:r="http://schemas.openxmlformats.org/officeDocument/2006/relationships" xmlns:p="http://schemas.openxmlformats.org/presentationml/2006/main" xmlns:p14="http://schemas.microsoft.com/office/powerpoint/2010/main">
-  <p:cSld>
-    <p:spTree>
-      <p:nvGrpSpPr>
-        <p:cNvPr id="1" name=""/>
-        <p:cNvGrpSpPr/>
-        <p:nvPr/>
-      </p:nvGrpSpPr>
-      <p:grpSpPr>
-        <a:xfrm>
-          <a:off x="0" y="0"/>
-          <a:ext cx="0" cy="0"/>
-          <a:chOff x="0" y="0"/>
-          <a:chExt cx="0" cy="0"/>
-        </a:xfrm>
-      </p:grpSpPr>
-      <p:sp>
-        <p:nvSpPr>
-          <p:cNvPr id="2" name="Rect 0"/>
-          <p:cNvSpPr txBox="1">
-            <a:spLocks/>
-          </p:cNvSpPr>
-          <p:nvPr/>
-        </p:nvSpPr>
-        <p:spPr>
-          <a:xfrm rot="0">
-            <a:off x="4339590" y="383540"/>
-            <a:ext cx="3524885" cy="478155"/>
-          </a:xfrm>
-          <a:prstGeom prst="rect"/>
-          <a:noFill/>
-          <a:ln w="0">
-            <a:noFill/>
-            <a:prstDash/>
-          </a:ln>
-        </p:spPr>
-        <p:txBody>
-          <a:bodyPr wrap="square" lIns="89535" tIns="46355" rIns="89535" bIns="46355" numCol="1" vert="horz" anchor="t">
-            <a:spAutoFit/>
-          </a:bodyPr>
-          <a:lstStyle/>
-          <a:p>
-            <a:pPr marL="0" indent="0" rtl="0" algn="ctr" defTabSz="914400" eaLnBrk="1" latinLnBrk="0" hangingPunct="1">
-              <a:buFontTx/>
-              <a:buNone/>
-            </a:pPr>
-            <a:r>
-              <a:rPr lang="ko-KR" sz="2500" b="1">
-                <a:solidFill>
-                  <a:schemeClr val="tx1"/>
-                </a:solidFill>
-                <a:latin typeface="나눔바른고딕" charset="0"/>
-                <a:ea typeface="나눔바른고딕" charset="0"/>
-              </a:rPr>
-              <a:t>열한</a:t>
-            </a:r>
-            <a:r>
-              <a:rPr lang="ko-KR" sz="2500" b="1">
-                <a:solidFill>
-                  <a:schemeClr val="tx1"/>
-                </a:solidFill>
-                <a:latin typeface="나눔바른고딕" charset="0"/>
-                <a:ea typeface="나눔바른고딕" charset="0"/>
-              </a:rPr>
-              <a:t> 번째 튜토리얼</a:t>
-            </a:r>
-            <a:endParaRPr lang="ko-KR" altLang="en-US" sz="2500" b="1">
-              <a:solidFill>
-                <a:schemeClr val="tx1"/>
-              </a:solidFill>
-              <a:latin typeface="나눔바른고딕" charset="0"/>
-              <a:ea typeface="나눔바른고딕" charset="0"/>
-            </a:endParaRPr>
-          </a:p>
-        </p:txBody>
-      </p:sp>
-      <p:sp>
-        <p:nvSpPr>
-          <p:cNvPr id="91" name="Rect 0"/>
-          <p:cNvSpPr txBox="1">
-            <a:spLocks/>
-          </p:cNvSpPr>
-          <p:nvPr/>
-        </p:nvSpPr>
-        <p:spPr>
-          <a:xfrm>
-            <a:off x="1247775" y="4084955"/>
-            <a:ext cx="4139565" cy="2061845"/>
-          </a:xfrm>
-          <a:prstGeom prst="rect"/>
-          <a:noFill/>
-          <a:ln w="0">
-            <a:noFill/>
-            <a:prstDash/>
-          </a:ln>
-        </p:spPr>
-        <p:txBody>
-          <a:bodyPr wrap="square" lIns="89535" tIns="46355" rIns="89535" bIns="46355" numCol="1" vert="horz" anchor="t">
-            <a:spAutoFit/>
-          </a:bodyPr>
-          <a:lstStyle/>
-          <a:p>
-            <a:pPr marL="0" indent="0" rtl="0" algn="l" defTabSz="914400" eaLnBrk="1" latinLnBrk="0" hangingPunct="1">
-              <a:buFontTx/>
-              <a:buNone/>
-            </a:pPr>
-            <a:r>
-              <a:rPr lang="ko-KR" sz="2000" b="1">
-                <a:solidFill>
-                  <a:srgbClr val="0611F2"/>
-                </a:solidFill>
-                <a:latin typeface="맑은 고딕" charset="0"/>
-                <a:ea typeface="맑은 고딕" charset="0"/>
-              </a:rPr>
-              <a:t>3</a:t>
-            </a:r>
-            <a:r>
-              <a:rPr lang="ko-KR" sz="2000" b="1">
-                <a:solidFill>
-                  <a:srgbClr val="0611F2"/>
-                </a:solidFill>
-                <a:latin typeface="맑은 고딕" charset="0"/>
-                <a:ea typeface="맑은 고딕" charset="0"/>
-              </a:rPr>
-              <a:t>2</a:t>
-            </a:r>
-            <a:r>
-              <a:rPr sz="2000" b="1">
-                <a:solidFill>
-                  <a:srgbClr val="0611F2"/>
-                </a:solidFill>
-                <a:latin typeface="맑은 고딕" charset="0"/>
-                <a:ea typeface="맑은 고딕" charset="0"/>
-              </a:rPr>
-              <a:t>. </a:t>
-            </a:r>
-            <a:r>
-              <a:rPr lang="ko-KR" sz="1800">
-                <a:latin typeface="맑은 고딕" charset="0"/>
-                <a:ea typeface="맑은 고딕" charset="0"/>
-              </a:rPr>
-              <a:t>그리고 OnMouseDown( ) 함수를 선언한 다음 state 오브젝트</a:t>
-            </a:r>
-            <a:r>
-              <a:rPr lang="ko-KR" sz="1800">
-                <a:latin typeface="맑은 고딕" charset="0"/>
-                <a:ea typeface="맑은 고딕" charset="0"/>
-              </a:rPr>
-              <a:t>가</a:t>
-            </a:r>
-            <a:r>
-              <a:rPr lang="ko-KR" sz="1800">
-                <a:latin typeface="맑은 고딕" charset="0"/>
-                <a:ea typeface="맑은 고딕" charset="0"/>
-              </a:rPr>
-              <a:t> 활성화</a:t>
-            </a:r>
-            <a:r>
-              <a:rPr lang="ko-KR" sz="1800">
-                <a:latin typeface="맑은 고딕" charset="0"/>
-                <a:ea typeface="맑은 고딕" charset="0"/>
-              </a:rPr>
-              <a:t>되</a:t>
-            </a:r>
-            <a:r>
-              <a:rPr lang="ko-KR" sz="1800">
-                <a:latin typeface="맑은 고딕" charset="0"/>
-                <a:ea typeface="맑은 고딕" charset="0"/>
-              </a:rPr>
-              <a:t>도록 </a:t>
-            </a:r>
-            <a:r>
-              <a:rPr lang="ko-KR" sz="1800">
-                <a:latin typeface="맑은 고딕" charset="0"/>
-                <a:ea typeface="맑은 고딕" charset="0"/>
-              </a:rPr>
-              <a:t>설정</a:t>
-            </a:r>
-            <a:r>
-              <a:rPr lang="ko-KR" sz="1800">
-                <a:latin typeface="맑은 고딕" charset="0"/>
-                <a:ea typeface="맑은 고딕" charset="0"/>
-              </a:rPr>
-              <a:t>합니다.</a:t>
-            </a:r>
-            <a:endParaRPr lang="ko-KR" altLang="en-US" sz="1800">
-              <a:latin typeface="맑은 고딕" charset="0"/>
-              <a:ea typeface="맑은 고딕" charset="0"/>
-            </a:endParaRPr>
-          </a:p>
-          <a:p>
-            <a:pPr marL="0" indent="0" rtl="0" algn="l" defTabSz="914400" eaLnBrk="1" latinLnBrk="0" hangingPunct="1">
-              <a:buFontTx/>
-              <a:buNone/>
-            </a:pPr>
-            <a:endParaRPr lang="ko-KR" altLang="en-US" sz="1800">
-              <a:latin typeface="맑은 고딕" charset="0"/>
-              <a:ea typeface="맑은 고딕" charset="0"/>
-            </a:endParaRPr>
-          </a:p>
-          <a:p>
-            <a:pPr marL="0" indent="0" rtl="0" algn="l" defTabSz="914400" eaLnBrk="1" latinLnBrk="0" hangingPunct="1">
-              <a:buFontTx/>
-              <a:buNone/>
-            </a:pPr>
-            <a:r>
-              <a:rPr lang="ko-KR" sz="1800">
-                <a:latin typeface="맑은 고딕" charset="0"/>
-                <a:ea typeface="맑은 고딕" charset="0"/>
-              </a:rPr>
-              <a:t>그런 다음 RigidBody가 물리적인 영향을 받지 않도록 isKinematic을 활성화합니다.</a:t>
-            </a:r>
-            <a:endParaRPr lang="ko-KR" altLang="en-US" sz="1800">
-              <a:latin typeface="맑은 고딕" charset="0"/>
-              <a:ea typeface="맑은 고딕" charset="0"/>
-            </a:endParaRPr>
-          </a:p>
-        </p:txBody>
-      </p:sp>
-      <p:pic>
-        <p:nvPicPr>
-          <p:cNvPr id="98" name="그림 68"/>
-          <p:cNvPicPr>
-            <a:picLocks noChangeAspect="1"/>
-          </p:cNvPicPr>
-          <p:nvPr/>
-        </p:nvPicPr>
-        <p:blipFill rotWithShape="1">
-          <a:blip r:embed="rId2" cstate="print">
-            <a:extLst>
-              <a:ext uri="{28A0092B-C50C-407E-A947-70E740481C1C}">
-                <a14:useLocalDpi xmlns:a14="http://schemas.microsoft.com/office/drawing/2010/main" val="0"/>
-              </a:ext>
-            </a:extLst>
-          </a:blip>
-          <a:stretch>
-            <a:fillRect/>
-          </a:stretch>
-        </p:blipFill>
-        <p:spPr>
-          <a:xfrm rot="0">
-            <a:off x="1236345" y="1445895"/>
-            <a:ext cx="4150360" cy="2468880"/>
-          </a:xfrm>
-          <a:prstGeom prst="roundRect"/>
-          <a:solidFill>
-            <a:srgbClr val="EDEDED"/>
-          </a:solidFill>
-        </p:spPr>
-      </p:pic>
-      <p:pic>
-        <p:nvPicPr>
-          <p:cNvPr id="99" name="그림 75"/>
-          <p:cNvPicPr>
-            <a:picLocks noChangeAspect="1"/>
-          </p:cNvPicPr>
-          <p:nvPr/>
-        </p:nvPicPr>
-        <p:blipFill rotWithShape="1">
-          <a:blip r:embed="rId3" cstate="print">
-            <a:extLst>
-              <a:ext uri="{28A0092B-C50C-407E-A947-70E740481C1C}">
-                <a14:useLocalDpi xmlns:a14="http://schemas.microsoft.com/office/drawing/2010/main" val="0"/>
-              </a:ext>
-            </a:extLst>
-          </a:blip>
-          <a:stretch>
-            <a:fillRect/>
-          </a:stretch>
-        </p:blipFill>
-        <p:spPr>
-          <a:xfrm rot="0">
-            <a:off x="6814820" y="1445895"/>
-            <a:ext cx="4139565" cy="2479040"/>
-          </a:xfrm>
-          <a:prstGeom prst="roundRect"/>
-          <a:solidFill>
-            <a:srgbClr val="EDEDED"/>
-          </a:solidFill>
-        </p:spPr>
-      </p:pic>
-      <p:sp>
-        <p:nvSpPr>
-          <p:cNvPr id="100" name="텍스트 상자 78"/>
-          <p:cNvSpPr txBox="1">
-            <a:spLocks/>
-          </p:cNvSpPr>
-          <p:nvPr/>
-        </p:nvSpPr>
-        <p:spPr>
-          <a:xfrm>
-            <a:off x="6809105" y="4087495"/>
-            <a:ext cx="4137660" cy="2061845"/>
-          </a:xfrm>
-          <a:prstGeom prst="rect"/>
-          <a:noFill/>
-          <a:ln w="0">
-            <a:noFill/>
-            <a:prstDash/>
-          </a:ln>
-        </p:spPr>
-        <p:txBody>
-          <a:bodyPr wrap="square" lIns="89535" tIns="46355" rIns="89535" bIns="46355" numCol="1" vert="horz" anchor="t">
-            <a:spAutoFit/>
-          </a:bodyPr>
-          <a:lstStyle/>
-          <a:p>
-            <a:pPr marL="0" indent="0" rtl="0" algn="l" defTabSz="914400" eaLnBrk="1" latinLnBrk="0" hangingPunct="1">
-              <a:buFontTx/>
-              <a:buNone/>
-            </a:pPr>
-            <a:r>
-              <a:rPr lang="ko-KR" sz="2000" b="1">
-                <a:solidFill>
-                  <a:srgbClr val="0611F2"/>
-                </a:solidFill>
-                <a:latin typeface="맑은 고딕" charset="0"/>
-                <a:ea typeface="맑은 고딕" charset="0"/>
-              </a:rPr>
-              <a:t>3</a:t>
-            </a:r>
-            <a:r>
-              <a:rPr lang="ko-KR" sz="2000" b="1">
-                <a:solidFill>
-                  <a:srgbClr val="0611F2"/>
-                </a:solidFill>
-                <a:latin typeface="맑은 고딕" charset="0"/>
-                <a:ea typeface="맑은 고딕" charset="0"/>
-              </a:rPr>
-              <a:t>3</a:t>
-            </a:r>
-            <a:r>
-              <a:rPr sz="2000" b="1">
-                <a:solidFill>
-                  <a:srgbClr val="0611F2"/>
-                </a:solidFill>
-                <a:latin typeface="맑은 고딕" charset="0"/>
-                <a:ea typeface="맑은 고딕" charset="0"/>
-              </a:rPr>
-              <a:t>. </a:t>
-            </a:r>
-            <a:r>
-              <a:rPr lang="ko-KR" sz="1800">
-                <a:latin typeface="맑은 고딕" charset="0"/>
-                <a:ea typeface="맑은 고딕" charset="0"/>
-              </a:rPr>
-              <a:t>그러고 나서 OnMouseDrag( ) 함수를 선언하고 마우스 위치 정보를 설정합니다.</a:t>
-            </a:r>
-            <a:endParaRPr lang="ko-KR" altLang="en-US" sz="1800">
-              <a:latin typeface="맑은 고딕" charset="0"/>
-              <a:ea typeface="맑은 고딕" charset="0"/>
-            </a:endParaRPr>
-          </a:p>
-          <a:p>
-            <a:pPr marL="0" indent="0" rtl="0" algn="l" defTabSz="914400" eaLnBrk="1" latinLnBrk="0" hangingPunct="1">
-              <a:buFontTx/>
-              <a:buNone/>
-            </a:pPr>
-            <a:endParaRPr lang="ko-KR" altLang="en-US" sz="1800">
-              <a:latin typeface="맑은 고딕" charset="0"/>
-              <a:ea typeface="맑은 고딕" charset="0"/>
-            </a:endParaRPr>
-          </a:p>
-          <a:p>
-            <a:pPr marL="0" indent="0" rtl="0" algn="l" defTabSz="914400" eaLnBrk="1" latinLnBrk="0" hangingPunct="1">
-              <a:buFontTx/>
-              <a:buNone/>
-            </a:pPr>
-            <a:r>
-              <a:rPr lang="ko-KR" sz="1800">
-                <a:latin typeface="맑은 고딕" charset="0"/>
-                <a:ea typeface="맑은 고딕" charset="0"/>
-              </a:rPr>
-              <a:t>마지막으로 스크린 공간에 있는 좌표 정보를 변환하여 게임 오브젝트의 위치로 저장합니다.</a:t>
-            </a:r>
-            <a:endParaRPr lang="ko-KR" altLang="en-US" sz="1800">
-              <a:latin typeface="맑은 고딕" charset="0"/>
-              <a:ea typeface="맑은 고딕" charset="0"/>
-            </a:endParaRPr>
-          </a:p>
-        </p:txBody>
-      </p:sp>
-    </p:spTree>
-  </p:cSld>
-  <p:clrMapOvr>
-    <a:masterClrMapping/>
-  </p:clrMapOvr>
-  <mc:AlternateContent xmlns:mc="http://schemas.openxmlformats.org/markup-compatibility/2006">
-    <mc:Choice xmlns:p14="http://schemas.microsoft.com/office/powerpoint/2010/main" Requires="p14">
-      <p:transition spd="slow" p14:dur="1000"/>
-    </mc:Choice>
-    <mc:Fallback>
-      <p:transition spd="slow"/>
-    </mc:Fallback>
-  </mc:AlternateContent>
-  <p:timing>
-    <p:tnLst>
-      <p:par>
-        <p:cTn id="1" dur="indefinite" restart="never" nodeType="tmRoot"/>
-      </p:par>
-    </p:tnLst>
-  </p:timing>
-</p:sld>
-</file>
-
-<file path=ppt/slides/slide13.xml><?xml version="1.0" encoding="utf-8"?>
-<p:sld xmlns:a="http://schemas.openxmlformats.org/drawingml/2006/main" xmlns:r="http://schemas.openxmlformats.org/officeDocument/2006/relationships" xmlns:p="http://schemas.openxmlformats.org/presentationml/2006/main" xmlns:p14="http://schemas.microsoft.com/office/powerpoint/2010/main">
-  <p:cSld>
-    <p:spTree>
-      <p:nvGrpSpPr>
-        <p:cNvPr id="1" name=""/>
-        <p:cNvGrpSpPr/>
-        <p:nvPr/>
-      </p:nvGrpSpPr>
-      <p:grpSpPr>
-        <a:xfrm>
-          <a:off x="0" y="0"/>
-          <a:ext cx="0" cy="0"/>
-          <a:chOff x="0" y="0"/>
-          <a:chExt cx="0" cy="0"/>
-        </a:xfrm>
-      </p:grpSpPr>
-      <p:sp>
-        <p:nvSpPr>
-          <p:cNvPr id="2" name="Rect 0"/>
-          <p:cNvSpPr txBox="1">
-            <a:spLocks/>
-          </p:cNvSpPr>
-          <p:nvPr/>
-        </p:nvSpPr>
-        <p:spPr>
-          <a:xfrm rot="0">
-            <a:off x="4339590" y="441960"/>
-            <a:ext cx="3508375" cy="478155"/>
-          </a:xfrm>
-          <a:prstGeom prst="rect"/>
-          <a:noFill/>
-          <a:ln w="0">
-            <a:noFill/>
-            <a:prstDash/>
-          </a:ln>
-        </p:spPr>
-        <p:txBody>
-          <a:bodyPr wrap="square" lIns="89535" tIns="46355" rIns="89535" bIns="46355" numCol="1" vert="horz" anchor="t">
-            <a:spAutoFit/>
-          </a:bodyPr>
-          <a:lstStyle/>
-          <a:p>
-            <a:pPr marL="0" indent="0" rtl="0" algn="ctr" defTabSz="914400" eaLnBrk="1" latinLnBrk="0" hangingPunct="1">
-              <a:buFontTx/>
-              <a:buNone/>
-            </a:pPr>
-            <a:r>
-              <a:rPr lang="ko-KR" sz="2500" b="1">
-                <a:solidFill>
-                  <a:schemeClr val="tx1"/>
-                </a:solidFill>
-                <a:latin typeface="나눔바른고딕" charset="0"/>
-                <a:ea typeface="나눔바른고딕" charset="0"/>
-              </a:rPr>
-              <a:t>Space Conversion</a:t>
-            </a:r>
-            <a:endParaRPr lang="ko-KR" altLang="en-US" sz="2500" b="1">
-              <a:solidFill>
-                <a:schemeClr val="tx1"/>
-              </a:solidFill>
-              <a:latin typeface="나눔바른고딕" charset="0"/>
-              <a:ea typeface="나눔바른고딕" charset="0"/>
-            </a:endParaRPr>
-          </a:p>
-        </p:txBody>
-      </p:sp>
-      <p:sp>
-        <p:nvSpPr>
-          <p:cNvPr id="3" name="텍스트 상자 9"/>
-          <p:cNvSpPr txBox="1">
-            <a:spLocks/>
-          </p:cNvSpPr>
-          <p:nvPr/>
-        </p:nvSpPr>
-        <p:spPr>
-          <a:xfrm rot="0">
-            <a:off x="1222375" y="1445895"/>
-            <a:ext cx="4156710" cy="1200785"/>
-          </a:xfrm>
-          <a:prstGeom prst="rect"/>
-          <a:noFill/>
-          <a:ln w="0">
-            <a:noFill/>
-            <a:prstDash/>
-          </a:ln>
-        </p:spPr>
-        <p:txBody>
-          <a:bodyPr wrap="square" lIns="89535" tIns="46355" rIns="89535" bIns="46355" vert="horz" anchor="t">
-            <a:spAutoFit/>
-          </a:bodyPr>
-          <a:lstStyle/>
-          <a:p>
-            <a:pPr marL="0" indent="0" rtl="0" algn="l" defTabSz="914400" eaLnBrk="1" latinLnBrk="0" hangingPunct="1">
-              <a:buFontTx/>
-              <a:buNone/>
-            </a:pPr>
-            <a:r>
-              <a:rPr sz="1800">
-                <a:latin typeface="맑은 고딕" charset="0"/>
-                <a:ea typeface="맑은 고딕" charset="0"/>
-              </a:rPr>
-              <a:t>ScreenPointToRay( ) 함수는 스크린 공간의 좌표를 월드 공간의 좌표로 변환하여 시작점으로 설정하는 함수입니다. </a:t>
-            </a:r>
-            <a:endParaRPr lang="ko-KR" altLang="en-US" sz="1800">
-              <a:latin typeface="맑은 고딕" charset="0"/>
-              <a:ea typeface="맑은 고딕" charset="0"/>
-            </a:endParaRPr>
-          </a:p>
-        </p:txBody>
-      </p:sp>
-      <p:sp>
-        <p:nvSpPr>
-          <p:cNvPr id="4" name="텍스트 상자 10"/>
-          <p:cNvSpPr txBox="1">
-            <a:spLocks/>
-          </p:cNvSpPr>
-          <p:nvPr/>
-        </p:nvSpPr>
-        <p:spPr>
-          <a:xfrm rot="0">
-            <a:off x="1214120" y="5578475"/>
-            <a:ext cx="4156710" cy="647065"/>
-          </a:xfrm>
-          <a:prstGeom prst="rect"/>
-          <a:noFill/>
-          <a:ln w="0">
-            <a:noFill/>
-            <a:prstDash/>
-          </a:ln>
-        </p:spPr>
-        <p:txBody>
-          <a:bodyPr wrap="square" lIns="89535" tIns="46355" rIns="89535" bIns="46355" vert="horz" anchor="t">
-            <a:spAutoFit/>
-          </a:bodyPr>
-          <a:lstStyle/>
-          <a:p>
-            <a:pPr marL="0" indent="0" rtl="0" algn="l" defTabSz="914400" eaLnBrk="1" latinLnBrk="0" hangingPunct="1">
-              <a:buFontTx/>
-              <a:buNone/>
-            </a:pPr>
-            <a:r>
-              <a:rPr sz="1800">
-                <a:latin typeface="맑은 고딕" charset="0"/>
-                <a:ea typeface="맑은 고딕" charset="0"/>
-              </a:rPr>
-              <a:t>방향은 카메라가 비추는 방향으로 설정된 광선 객체를 반환합니다.</a:t>
-            </a:r>
-            <a:endParaRPr lang="ko-KR" altLang="en-US" sz="1800">
-              <a:latin typeface="맑은 고딕" charset="0"/>
-              <a:ea typeface="맑은 고딕" charset="0"/>
-            </a:endParaRPr>
-          </a:p>
-        </p:txBody>
-      </p:sp>
-      <p:pic>
-        <p:nvPicPr>
-          <p:cNvPr id="6" name="그림 12"/>
-          <p:cNvPicPr>
-            <a:picLocks noChangeAspect="1"/>
-          </p:cNvPicPr>
-          <p:nvPr/>
-        </p:nvPicPr>
-        <p:blipFill rotWithShape="1">
-          <a:blip r:embed="rId1" cstate="print">
-            <a:extLst>
-              <a:ext uri="{28A0092B-C50C-407E-A947-70E740481C1C}">
-                <a14:useLocalDpi xmlns:a14="http://schemas.microsoft.com/office/drawing/2010/main" val="0"/>
-              </a:ext>
-            </a:extLst>
-          </a:blip>
-          <a:stretch>
-            <a:fillRect/>
-          </a:stretch>
-        </p:blipFill>
-        <p:spPr>
-          <a:xfrm rot="0">
-            <a:off x="1213485" y="2818130"/>
-            <a:ext cx="4156075" cy="2552700"/>
-          </a:xfrm>
-          <a:prstGeom prst="roundRect"/>
-          <a:solidFill>
-            <a:srgbClr val="EDEDED"/>
-          </a:solidFill>
-        </p:spPr>
-      </p:pic>
-      <p:pic>
-        <p:nvPicPr>
-          <p:cNvPr id="7" name="그림 21"/>
-          <p:cNvPicPr>
-            <a:picLocks noChangeAspect="1"/>
-          </p:cNvPicPr>
-          <p:nvPr/>
-        </p:nvPicPr>
-        <p:blipFill rotWithShape="1">
-          <a:blip r:embed="rId2" cstate="hqprint">
-            <a:extLst>
-              <a:ext uri="{28A0092B-C50C-407E-A947-70E740481C1C}">
-                <a14:useLocalDpi xmlns:a14="http://schemas.microsoft.com/office/drawing/2010/main"/>
-              </a:ext>
-            </a:extLst>
-          </a:blip>
-          <a:stretch>
-            <a:fillRect/>
-          </a:stretch>
-        </p:blipFill>
-        <p:spPr>
-          <a:xfrm rot="0">
-            <a:off x="6816725" y="2875915"/>
-            <a:ext cx="4149090" cy="1965325"/>
-          </a:xfrm>
-          <a:prstGeom prst="roundRect"/>
-          <a:solidFill>
-            <a:srgbClr val="EDEDED"/>
-          </a:solidFill>
-        </p:spPr>
-      </p:pic>
-      <p:sp>
-        <p:nvSpPr>
-          <p:cNvPr id="8" name="텍스트 상자 22"/>
-          <p:cNvSpPr txBox="1">
-            <a:spLocks/>
-          </p:cNvSpPr>
-          <p:nvPr/>
-        </p:nvSpPr>
-        <p:spPr>
-          <a:xfrm rot="0">
-            <a:off x="6816725" y="1457325"/>
-            <a:ext cx="4140835" cy="1200785"/>
-          </a:xfrm>
-          <a:prstGeom prst="rect"/>
-          <a:noFill/>
-          <a:ln w="0">
-            <a:noFill/>
-            <a:prstDash/>
-          </a:ln>
-        </p:spPr>
-        <p:txBody>
-          <a:bodyPr wrap="square" lIns="89535" tIns="46355" rIns="89535" bIns="46355" numCol="1" vert="horz" anchor="t">
-            <a:spAutoFit/>
-          </a:bodyPr>
-          <a:lstStyle/>
-          <a:p>
-            <a:pPr marL="0" indent="0" rtl="0" algn="l" defTabSz="914400" eaLnBrk="1" latinLnBrk="0" hangingPunct="1">
-              <a:buFontTx/>
-              <a:buNone/>
-            </a:pPr>
-            <a:r>
-              <a:rPr lang="ko-KR" sz="1800" b="0">
-                <a:solidFill>
-                  <a:schemeClr val="tx1"/>
-                </a:solidFill>
-                <a:latin typeface="맑은 고딕" charset="0"/>
-                <a:ea typeface="맑은 고딕" charset="0"/>
-              </a:rPr>
-              <a:t>스크린 공간에서 </a:t>
-            </a:r>
-            <a:r>
-              <a:rPr lang="ko-KR" sz="1800" b="0">
-                <a:solidFill>
-                  <a:schemeClr val="tx1"/>
-                </a:solidFill>
-                <a:latin typeface="맑은 고딕" charset="0"/>
-                <a:ea typeface="맑은 고딕" charset="0"/>
-              </a:rPr>
-              <a:t>마우스를 입력했을 때 지정된 좌표 정보를 월드 공간의 위치로 변환한 다음 게임 오브젝트의 위치로 설정합니다. </a:t>
-            </a:r>
-            <a:endParaRPr lang="ko-KR" altLang="en-US" sz="1800" b="0">
-              <a:solidFill>
-                <a:schemeClr val="tx1"/>
-              </a:solidFill>
-              <a:latin typeface="맑은 고딕" charset="0"/>
-              <a:ea typeface="맑은 고딕" charset="0"/>
-            </a:endParaRPr>
-          </a:p>
-        </p:txBody>
-      </p:sp>
-      <p:sp>
-        <p:nvSpPr>
-          <p:cNvPr id="9" name="텍스트 상자 23"/>
-          <p:cNvSpPr txBox="1">
-            <a:spLocks/>
-          </p:cNvSpPr>
-          <p:nvPr/>
-        </p:nvSpPr>
-        <p:spPr>
-          <a:xfrm rot="0">
-            <a:off x="6814820" y="5028565"/>
-            <a:ext cx="4142740" cy="1200785"/>
-          </a:xfrm>
-          <a:prstGeom prst="rect"/>
-          <a:noFill/>
-          <a:ln w="0">
-            <a:noFill/>
-            <a:prstDash/>
-          </a:ln>
-        </p:spPr>
-        <p:txBody>
-          <a:bodyPr wrap="square" lIns="89535" tIns="46355" rIns="89535" bIns="46355" numCol="1" vert="horz" anchor="t">
-            <a:spAutoFit/>
-          </a:bodyPr>
-          <a:lstStyle/>
-          <a:p>
-            <a:pPr marL="0" indent="0" rtl="0" algn="l" defTabSz="914400" eaLnBrk="1" latinLnBrk="0" hangingPunct="1">
-              <a:buFontTx/>
-              <a:buNone/>
-            </a:pPr>
-            <a:r>
-              <a:rPr sz="1800">
-                <a:latin typeface="맑은 고딕" charset="0"/>
-                <a:ea typeface="맑은 고딕" charset="0"/>
-              </a:rPr>
-              <a:t>3차원 공간에서 마우스로 게임 오브젝트를 선택하려면 스크린 공간의 위치를 월드 공간의 위치로 변환해주어야 합니다.</a:t>
-            </a:r>
-            <a:endParaRPr lang="ko-KR" altLang="en-US" sz="1800">
-              <a:latin typeface="맑은 고딕" charset="0"/>
-              <a:ea typeface="맑은 고딕" charset="0"/>
-            </a:endParaRPr>
-          </a:p>
-        </p:txBody>
-      </p:sp>
-    </p:spTree>
-  </p:cSld>
-  <p:clrMapOvr>
-    <a:masterClrMapping/>
-  </p:clrMapOvr>
-  <mc:AlternateContent xmlns:mc="http://schemas.openxmlformats.org/markup-compatibility/2006">
-    <mc:Choice xmlns:p14="http://schemas.microsoft.com/office/powerpoint/2010/main" Requires="p14">
-      <p:transition spd="slow" p14:dur="1000"/>
-    </mc:Choice>
-    <mc:Fallback>
-      <p:transition spd="slow"/>
-    </mc:Fallback>
-  </mc:AlternateContent>
-  <p:timing>
-    <p:tnLst>
-      <p:par>
-        <p:cTn id="1" dur="indefinite" restart="never" nodeType="tmRoot"/>
-      </p:par>
-    </p:tnLst>
-  </p:timing>
-</p:sld>
-</file>
-
-<file path=ppt/slides/slide14.xml><?xml version="1.0" encoding="utf-8"?>
+<file path=ppt/slides/slide11.xml><?xml version="1.0" encoding="utf-8"?>
 <p:sld xmlns:a="http://schemas.openxmlformats.org/drawingml/2006/main" xmlns:r="http://schemas.openxmlformats.org/officeDocument/2006/relationships" xmlns:p="http://schemas.openxmlformats.org/presentationml/2006/main">
   <p:cSld>
     <p:spTree>
@@ -8053,7 +6926,7 @@
 </p:sld>
 </file>
 
-<file path=ppt/slides/slide15.xml><?xml version="1.0" encoding="utf-8"?>
+<file path=ppt/slides/slide12.xml><?xml version="1.0" encoding="utf-8"?>
 <p:sld xmlns:a="http://schemas.openxmlformats.org/drawingml/2006/main" xmlns:r="http://schemas.openxmlformats.org/officeDocument/2006/relationships" xmlns:p="http://schemas.openxmlformats.org/presentationml/2006/main">
   <p:cSld>
     <p:spTree>
@@ -8621,406 +7494,6 @@
           </a:solidFill>
         </p:spPr>
       </p:pic>
-    </p:spTree>
-  </p:cSld>
-  <p:clrMapOvr>
-    <a:masterClrMapping/>
-  </p:clrMapOvr>
-  <mc:AlternateContent xmlns:mc="http://schemas.openxmlformats.org/markup-compatibility/2006">
-    <mc:Choice xmlns:p14="http://schemas.microsoft.com/office/powerpoint/2010/main" Requires="p14">
-      <p:transition spd="slow" p14:dur="1000"/>
-    </mc:Choice>
-    <mc:Fallback>
-      <p:transition spd="slow"/>
-    </mc:Fallback>
-  </mc:AlternateContent>
-  <p:timing>
-    <p:tnLst>
-      <p:par>
-        <p:cTn id="1" dur="indefinite" restart="never" nodeType="tmRoot"/>
-      </p:par>
-    </p:tnLst>
-  </p:timing>
-</p:sld>
-</file>
-
-<file path=ppt/slides/slide16.xml><?xml version="1.0" encoding="utf-8"?>
-<p:sld xmlns:a="http://schemas.openxmlformats.org/drawingml/2006/main" xmlns:r="http://schemas.openxmlformats.org/officeDocument/2006/relationships" xmlns:p="http://schemas.openxmlformats.org/presentationml/2006/main">
-  <p:cSld>
-    <p:spTree>
-      <p:nvGrpSpPr>
-        <p:cNvPr id="1" name=""/>
-        <p:cNvGrpSpPr/>
-        <p:nvPr/>
-      </p:nvGrpSpPr>
-      <p:grpSpPr>
-        <a:xfrm>
-          <a:off x="0" y="0"/>
-          <a:ext cx="0" cy="0"/>
-          <a:chOff x="0" y="0"/>
-          <a:chExt cx="0" cy="0"/>
-        </a:xfrm>
-      </p:grpSpPr>
-      <p:sp>
-        <p:nvSpPr>
-          <p:cNvPr id="2" name="Rect 0"/>
-          <p:cNvSpPr txBox="1">
-            <a:spLocks/>
-          </p:cNvSpPr>
-          <p:nvPr/>
-        </p:nvSpPr>
-        <p:spPr>
-          <a:xfrm rot="0">
-            <a:off x="4339590" y="383540"/>
-            <a:ext cx="3515360" cy="478155"/>
-          </a:xfrm>
-          <a:prstGeom prst="rect"/>
-          <a:noFill/>
-          <a:ln w="0">
-            <a:noFill/>
-            <a:prstDash/>
-          </a:ln>
-        </p:spPr>
-        <p:txBody>
-          <a:bodyPr wrap="square" lIns="89535" tIns="46355" rIns="89535" bIns="46355" numCol="1" vert="horz" anchor="t">
-            <a:spAutoFit/>
-          </a:bodyPr>
-          <a:lstStyle/>
-          <a:p>
-            <a:pPr marL="0" indent="0" rtl="0" algn="ctr" defTabSz="914400" eaLnBrk="1" latinLnBrk="0" hangingPunct="1">
-              <a:buFontTx/>
-              <a:buNone/>
-            </a:pPr>
-            <a:r>
-              <a:rPr lang="ko-KR" sz="2500" b="1">
-                <a:solidFill>
-                  <a:schemeClr val="tx1"/>
-                </a:solidFill>
-                <a:latin typeface="나눔바른고딕" charset="0"/>
-                <a:ea typeface="나눔바른고딕" charset="0"/>
-              </a:rPr>
-              <a:t>열</a:t>
-            </a:r>
-            <a:r>
-              <a:rPr lang="ko-KR" sz="2500" b="1">
-                <a:solidFill>
-                  <a:schemeClr val="tx1"/>
-                </a:solidFill>
-                <a:latin typeface="나눔바른고딕" charset="0"/>
-                <a:ea typeface="나눔바른고딕" charset="0"/>
-              </a:rPr>
-              <a:t>네</a:t>
-            </a:r>
-            <a:r>
-              <a:rPr lang="ko-KR" sz="2500" b="1">
-                <a:solidFill>
-                  <a:schemeClr val="tx1"/>
-                </a:solidFill>
-                <a:latin typeface="나눔바른고딕" charset="0"/>
-                <a:ea typeface="나눔바른고딕" charset="0"/>
-              </a:rPr>
-              <a:t> 번째 튜토리얼</a:t>
-            </a:r>
-            <a:endParaRPr lang="ko-KR" altLang="en-US" sz="2500" b="1">
-              <a:solidFill>
-                <a:schemeClr val="tx1"/>
-              </a:solidFill>
-              <a:latin typeface="나눔바른고딕" charset="0"/>
-              <a:ea typeface="나눔바른고딕" charset="0"/>
-            </a:endParaRPr>
-          </a:p>
-        </p:txBody>
-      </p:sp>
-      <p:sp>
-        <p:nvSpPr>
-          <p:cNvPr id="106" name="Rect 0"/>
-          <p:cNvSpPr txBox="1">
-            <a:spLocks/>
-          </p:cNvSpPr>
-          <p:nvPr/>
-        </p:nvSpPr>
-        <p:spPr>
-          <a:xfrm rot="0">
-            <a:off x="6813550" y="3048000"/>
-            <a:ext cx="4123690" cy="677545"/>
-          </a:xfrm>
-          <a:prstGeom prst="rect"/>
-          <a:noFill/>
-          <a:ln w="0">
-            <a:noFill/>
-            <a:prstDash/>
-          </a:ln>
-        </p:spPr>
-        <p:txBody>
-          <a:bodyPr wrap="square" lIns="89535" tIns="46355" rIns="89535" bIns="46355" numCol="1" vert="horz" anchor="t">
-            <a:spAutoFit/>
-          </a:bodyPr>
-          <a:lstStyle/>
-          <a:p>
-            <a:pPr marL="0" indent="0" rtl="0" algn="l" defTabSz="914400" eaLnBrk="1" latinLnBrk="0" hangingPunct="1">
-              <a:buFontTx/>
-              <a:buNone/>
-            </a:pPr>
-            <a:r>
-              <a:rPr lang="ko-KR" sz="2000" b="1">
-                <a:solidFill>
-                  <a:srgbClr val="0611F2"/>
-                </a:solidFill>
-                <a:latin typeface="맑은 고딕" charset="0"/>
-                <a:ea typeface="맑은 고딕" charset="0"/>
-              </a:rPr>
-              <a:t>41.</a:t>
-            </a:r>
-            <a:r>
-              <a:rPr sz="2000" b="1">
-                <a:solidFill>
-                  <a:srgbClr val="0611F2"/>
-                </a:solidFill>
-                <a:latin typeface="맑은 고딕" charset="0"/>
-                <a:ea typeface="맑은 고딕" charset="0"/>
-              </a:rPr>
-              <a:t> </a:t>
-            </a:r>
-            <a:r>
-              <a:rPr lang="ko-KR" sz="1800">
-                <a:latin typeface="맑은 고딕" charset="0"/>
-                <a:ea typeface="맑은 고딕" charset="0"/>
-              </a:rPr>
-              <a:t>그</a:t>
-            </a:r>
-            <a:r>
-              <a:rPr lang="ko-KR" sz="1800">
-                <a:latin typeface="맑은 고딕" charset="0"/>
-                <a:ea typeface="맑은 고딕" charset="0"/>
-              </a:rPr>
-              <a:t>다음 HD TV 오브젝트의 Layer를 Switch로 설정합니다.</a:t>
-            </a:r>
-            <a:endParaRPr lang="ko-KR" altLang="en-US" sz="1800">
-              <a:latin typeface="맑은 고딕" charset="0"/>
-              <a:ea typeface="맑은 고딕" charset="0"/>
-            </a:endParaRPr>
-          </a:p>
-        </p:txBody>
-      </p:sp>
-      <p:sp>
-        <p:nvSpPr>
-          <p:cNvPr id="115" name="Rect 0"/>
-          <p:cNvSpPr txBox="1">
-            <a:spLocks/>
-          </p:cNvSpPr>
-          <p:nvPr/>
-        </p:nvSpPr>
-        <p:spPr>
-          <a:xfrm rot="0">
-            <a:off x="1236980" y="5483860"/>
-            <a:ext cx="4141470" cy="677545"/>
-          </a:xfrm>
-          <a:prstGeom prst="rect"/>
-          <a:noFill/>
-          <a:ln w="0">
-            <a:noFill/>
-            <a:prstDash/>
-          </a:ln>
-        </p:spPr>
-        <p:txBody>
-          <a:bodyPr wrap="square" lIns="89535" tIns="46355" rIns="89535" bIns="46355" numCol="1" vert="horz" anchor="t">
-            <a:spAutoFit/>
-          </a:bodyPr>
-          <a:lstStyle/>
-          <a:p>
-            <a:pPr marL="0" indent="0" rtl="0" algn="l" defTabSz="914400" eaLnBrk="1" latinLnBrk="0" hangingPunct="1">
-              <a:buFontTx/>
-              <a:buNone/>
-            </a:pPr>
-            <a:r>
-              <a:rPr lang="ko-KR" sz="2000" b="1">
-                <a:solidFill>
-                  <a:srgbClr val="0611F2"/>
-                </a:solidFill>
-                <a:latin typeface="맑은 고딕" charset="0"/>
-                <a:ea typeface="맑은 고딕" charset="0"/>
-              </a:rPr>
-              <a:t>40</a:t>
-            </a:r>
-            <a:r>
-              <a:rPr sz="2000" b="1">
-                <a:solidFill>
-                  <a:srgbClr val="0611F2"/>
-                </a:solidFill>
-                <a:latin typeface="맑은 고딕" charset="0"/>
-                <a:ea typeface="맑은 고딕" charset="0"/>
-              </a:rPr>
-              <a:t>. </a:t>
-            </a:r>
-            <a:r>
-              <a:rPr lang="ko-KR" sz="1800">
-                <a:latin typeface="맑은 고딕" charset="0"/>
-                <a:ea typeface="맑은 고딕" charset="0"/>
-              </a:rPr>
-              <a:t>그런 다음 Layers에 Switch 레이어를 User Layer 3에 추가합니다.</a:t>
-            </a:r>
-            <a:endParaRPr lang="ko-KR" altLang="en-US" sz="1800">
-              <a:latin typeface="맑은 고딕" charset="0"/>
-              <a:ea typeface="맑은 고딕" charset="0"/>
-            </a:endParaRPr>
-          </a:p>
-        </p:txBody>
-      </p:sp>
-      <p:pic>
-        <p:nvPicPr>
-          <p:cNvPr id="119" name="그림 56" descr="C:/Users/Admin1/AppData/Roaming/PolarisOffice/ETemp/9740_18728032/fImage177602905705.png"/>
-          <p:cNvPicPr>
-            <a:picLocks noChangeAspect="1"/>
-          </p:cNvPicPr>
-          <p:nvPr/>
-        </p:nvPicPr>
-        <p:blipFill rotWithShape="1">
-          <a:blip r:embed="rId2" cstate="print">
-            <a:extLst>
-              <a:ext uri="{28A0092B-C50C-407E-A947-70E740481C1C}">
-                <a14:useLocalDpi xmlns:a14="http://schemas.microsoft.com/office/drawing/2010/main" val="0"/>
-              </a:ext>
-            </a:extLst>
-          </a:blip>
-          <a:stretch>
-            <a:fillRect/>
-          </a:stretch>
-        </p:blipFill>
-        <p:spPr>
-          <a:xfrm rot="0">
-            <a:off x="1229995" y="1437640"/>
-            <a:ext cx="4148455" cy="3862705"/>
-          </a:xfrm>
-          <a:prstGeom prst="rect"/>
-          <a:noFill/>
-        </p:spPr>
-      </p:pic>
-      <p:pic>
-        <p:nvPicPr>
-          <p:cNvPr id="120" name="그림 64" descr="C:/Users/Admin1/AppData/Roaming/PolarisOffice/ETemp/9740_18728032/fImage155802928145.png"/>
-          <p:cNvPicPr>
-            <a:picLocks noChangeAspect="1"/>
-          </p:cNvPicPr>
-          <p:nvPr/>
-        </p:nvPicPr>
-        <p:blipFill rotWithShape="1">
-          <a:blip r:embed="rId3" cstate="print">
-            <a:extLst>
-              <a:ext uri="{28A0092B-C50C-407E-A947-70E740481C1C}">
-                <a14:useLocalDpi xmlns:a14="http://schemas.microsoft.com/office/drawing/2010/main" val="0"/>
-              </a:ext>
-            </a:extLst>
-          </a:blip>
-          <a:stretch>
-            <a:fillRect/>
-          </a:stretch>
-        </p:blipFill>
-        <p:spPr>
-          <a:xfrm rot="0">
-            <a:off x="6814820" y="1445895"/>
-            <a:ext cx="4122420" cy="1464310"/>
-          </a:xfrm>
-          <a:prstGeom prst="roundRect"/>
-          <a:solidFill>
-            <a:srgbClr val="EDEDED"/>
-          </a:solidFill>
-        </p:spPr>
-      </p:pic>
-      <p:pic>
-        <p:nvPicPr>
-          <p:cNvPr id="121" name="그림 67" descr="C:/Users/Admin1/AppData/Roaming/PolarisOffice/ETemp/9740_18728032/fImage132102933281.png"/>
-          <p:cNvPicPr>
-            <a:picLocks noChangeAspect="1"/>
-          </p:cNvPicPr>
-          <p:nvPr/>
-        </p:nvPicPr>
-        <p:blipFill rotWithShape="1">
-          <a:blip r:embed="rId4" cstate="print">
-            <a:extLst>
-              <a:ext uri="{28A0092B-C50C-407E-A947-70E740481C1C}">
-                <a14:useLocalDpi xmlns:a14="http://schemas.microsoft.com/office/drawing/2010/main" val="0"/>
-              </a:ext>
-            </a:extLst>
-          </a:blip>
-          <a:stretch>
-            <a:fillRect/>
-          </a:stretch>
-        </p:blipFill>
-        <p:spPr>
-          <a:xfrm rot="0">
-            <a:off x="6814820" y="3913505"/>
-            <a:ext cx="4122420" cy="1481455"/>
-          </a:xfrm>
-          <a:prstGeom prst="roundRect"/>
-          <a:solidFill>
-            <a:srgbClr val="EDEDED"/>
-          </a:solidFill>
-        </p:spPr>
-      </p:pic>
-      <p:sp>
-        <p:nvSpPr>
-          <p:cNvPr id="122" name="텍스트 상자 70"/>
-          <p:cNvSpPr txBox="1">
-            <a:spLocks/>
-          </p:cNvSpPr>
-          <p:nvPr/>
-        </p:nvSpPr>
-        <p:spPr>
-          <a:xfrm rot="0">
-            <a:off x="6816090" y="5492750"/>
-            <a:ext cx="4123690" cy="677545"/>
-          </a:xfrm>
-          <a:prstGeom prst="rect"/>
-          <a:noFill/>
-          <a:ln w="0">
-            <a:noFill/>
-            <a:prstDash/>
-          </a:ln>
-        </p:spPr>
-        <p:txBody>
-          <a:bodyPr wrap="square" lIns="89535" tIns="46355" rIns="89535" bIns="46355" numCol="1" vert="horz" anchor="t">
-            <a:spAutoFit/>
-          </a:bodyPr>
-          <a:lstStyle/>
-          <a:p>
-            <a:pPr marL="0" indent="0" rtl="0" algn="l" defTabSz="914400" eaLnBrk="1" latinLnBrk="0" hangingPunct="1">
-              <a:buFontTx/>
-              <a:buNone/>
-            </a:pPr>
-            <a:r>
-              <a:rPr lang="ko-KR" sz="2000" b="1">
-                <a:solidFill>
-                  <a:srgbClr val="0611F2"/>
-                </a:solidFill>
-                <a:latin typeface="맑은 고딕" charset="0"/>
-                <a:ea typeface="맑은 고딕" charset="0"/>
-              </a:rPr>
-              <a:t>42.</a:t>
-            </a:r>
-            <a:r>
-              <a:rPr sz="2000" b="1">
-                <a:solidFill>
-                  <a:srgbClr val="0611F2"/>
-                </a:solidFill>
-                <a:latin typeface="맑은 고딕" charset="0"/>
-                <a:ea typeface="맑은 고딕" charset="0"/>
-              </a:rPr>
-              <a:t> </a:t>
-            </a:r>
-            <a:r>
-              <a:rPr lang="ko-KR" sz="1800">
-                <a:latin typeface="맑은 고딕" charset="0"/>
-                <a:ea typeface="맑은 고딕" charset="0"/>
-              </a:rPr>
-              <a:t>마지막으로 Mouse 스크립트의 Layer Mask를 Switch로 설정합니다.</a:t>
-            </a:r>
-            <a:endParaRPr lang="ko-KR" altLang="en-US" sz="1800">
-              <a:latin typeface="맑은 고딕" charset="0"/>
-              <a:ea typeface="맑은 고딕" charset="0"/>
-            </a:endParaRPr>
-          </a:p>
-        </p:txBody>
-      </p:sp>
     </p:spTree>
   </p:cSld>
   <p:clrMapOvr>
@@ -12754,7 +11227,7 @@
                 <a:latin typeface="나눔바른고딕" charset="0"/>
                 <a:ea typeface="나눔바른고딕" charset="0"/>
               </a:rPr>
-              <a:t>여덟</a:t>
+              <a:t>아홉</a:t>
             </a:r>
             <a:r>
               <a:rPr lang="ko-KR" sz="2500" b="1">
@@ -12824,7 +11297,7 @@
                 <a:latin typeface="맑은 고딕" charset="0"/>
                 <a:ea typeface="맑은 고딕" charset="0"/>
               </a:rPr>
-              <a:t>4</a:t>
+              <a:t>7</a:t>
             </a:r>
             <a:r>
               <a:rPr sz="2000" b="1">
@@ -12841,7 +11314,7 @@
                 <a:latin typeface="맑은 고딕" charset="0"/>
                 <a:ea typeface="맑은 고딕" charset="0"/>
               </a:rPr>
-              <a:t>이제 </a:t>
+              <a:t>그러고 나서 </a:t>
             </a:r>
             <a:r>
               <a:rPr lang="ko-KR" sz="1800" b="0">
@@ -12851,7 +11324,7 @@
                 <a:latin typeface="맑은 고딕" charset="0"/>
                 <a:ea typeface="맑은 고딕" charset="0"/>
               </a:rPr>
-              <a:t>HD TV 오브젝트의 위치와 회전 그리고 크기를 설정합니다.</a:t>
+              <a:t>Screen 오브젝트의 Video Player 컴포넌트를 추가합니다.</a:t>
             </a:r>
             <a:endParaRPr lang="ko-KR" altLang="en-US" sz="1800" b="0">
               <a:solidFill>
@@ -12872,9 +11345,9 @@
           <p:nvPr/>
         </p:nvSpPr>
         <p:spPr>
-          <a:xfrm>
-            <a:off x="6808470" y="4925060"/>
-            <a:ext cx="4132580" cy="1231265"/>
+          <a:xfrm rot="0">
+            <a:off x="6797675" y="2806700"/>
+            <a:ext cx="4157345" cy="1231265"/>
           </a:xfrm>
           <a:prstGeom prst="rect"/>
           <a:noFill/>
@@ -12911,7 +11384,7 @@
                 <a:latin typeface="맑은 고딕" charset="0"/>
                 <a:ea typeface="맑은 고딕" charset="0"/>
               </a:rPr>
-              <a:t>5</a:t>
+              <a:t>8</a:t>
             </a:r>
             <a:r>
               <a:rPr sz="2000" b="1">
@@ -12928,7 +11401,7 @@
                 <a:latin typeface="맑은 고딕" charset="0"/>
                 <a:ea typeface="맑은 고딕" charset="0"/>
               </a:rPr>
-              <a:t>그런 다음 HD TV 오브젝트 하위 오브젝트로 Quad 오브젝트를 생성하고 Screen이라는 이름으로 정의합니다.</a:t>
+              <a:t>이제 Project 폴더 아래에 있는 Video Player 폴더에 Game Video를 선택한 다음 Screen 오브젝트에 넣어줍니다.</a:t>
             </a:r>
             <a:endParaRPr lang="ko-KR" altLang="en-US" sz="1800">
               <a:latin typeface="맑은 고딕" charset="0"/>
@@ -12947,8 +11420,8 @@
         </p:nvSpPr>
         <p:spPr>
           <a:xfrm>
-            <a:off x="1223645" y="2747645"/>
-            <a:ext cx="4147820" cy="954405"/>
+            <a:off x="1223645" y="3194050"/>
+            <a:ext cx="4147820" cy="677545"/>
           </a:xfrm>
           <a:prstGeom prst="rect"/>
           <a:noFill/>
@@ -12985,7 +11458,7 @@
                 <a:latin typeface="맑은 고딕" charset="0"/>
                 <a:ea typeface="맑은 고딕" charset="0"/>
               </a:rPr>
-              <a:t>3</a:t>
+              <a:t>6</a:t>
             </a:r>
             <a:r>
               <a:rPr sz="2000" b="1">
@@ -13002,7 +11475,7 @@
                 <a:latin typeface="맑은 고딕" charset="0"/>
                 <a:ea typeface="맑은 고딕" charset="0"/>
               </a:rPr>
-              <a:t>그러고 나서 Project 폴더 아래에 있는 Model 폴더에 HD TV 모델을 선택한 다음 월드 공간에 배치합니다.</a:t>
+              <a:t>그다음 Screen 오브젝트의 위치와 회전 그리고 크기 값을 설정합니다.</a:t>
             </a:r>
             <a:endParaRPr lang="ko-KR" altLang="en-US" sz="1800">
               <a:latin typeface="맑은 고딕" charset="0"/>
@@ -13013,7 +11486,7 @@
       </p:sp>
       <p:pic>
         <p:nvPicPr>
-          <p:cNvPr id="101" name="그림 1"/>
+          <p:cNvPr id="108" name="그림 30"/>
           <p:cNvPicPr>
             <a:picLocks noChangeAspect="1"/>
           </p:cNvPicPr>
@@ -13033,8 +11506,8 @@
         </p:blipFill>
         <p:spPr>
           <a:xfrm rot="0">
-            <a:off x="1230630" y="1454785"/>
-            <a:ext cx="1272540" cy="1139190"/>
+            <a:off x="1229995" y="1438275"/>
+            <a:ext cx="4132580" cy="1662430"/>
           </a:xfrm>
           <a:prstGeom prst="roundRect"/>
           <a:solidFill>
@@ -13044,14 +11517,45 @@
       </p:pic>
       <p:pic>
         <p:nvPicPr>
-          <p:cNvPr id="102" name="그림 4"/>
+          <p:cNvPr id="109" name="그림 33" descr="C:/Users/Admin1/AppData/Roaming/PolarisOffice/ETemp/9740_18728032/fImage101942369358.png"/>
           <p:cNvPicPr>
             <a:picLocks noChangeAspect="1"/>
           </p:cNvPicPr>
           <p:nvPr/>
         </p:nvPicPr>
         <p:blipFill rotWithShape="1">
-          <a:blip r:embed="rId3" cstate="print">
+          <a:blip r:embed="rId3" cstate="hqprint">
+            <a:extLst>
+              <a:ext uri="{28A0092B-C50C-407E-A947-70E740481C1C}">
+                <a14:useLocalDpi xmlns:a14="http://schemas.microsoft.com/office/drawing/2010/main"/>
+              </a:ext>
+            </a:extLst>
+          </a:blip>
+          <a:stretch>
+            <a:fillRect/>
+          </a:stretch>
+        </p:blipFill>
+        <p:spPr>
+          <a:xfrm rot="0">
+            <a:off x="8239125" y="1446530"/>
+            <a:ext cx="2709545" cy="1264285"/>
+          </a:xfrm>
+          <a:prstGeom prst="roundRect"/>
+          <a:solidFill>
+            <a:srgbClr val="EDEDED"/>
+          </a:solidFill>
+        </p:spPr>
+      </p:pic>
+      <p:pic>
+        <p:nvPicPr>
+          <p:cNvPr id="112" name="그림 38"/>
+          <p:cNvPicPr>
+            <a:picLocks noChangeAspect="1"/>
+          </p:cNvPicPr>
+          <p:nvPr/>
+        </p:nvPicPr>
+        <p:blipFill rotWithShape="1">
+          <a:blip r:embed="rId4" cstate="print">
             <a:extLst>
               <a:ext uri="{28A0092B-C50C-407E-A947-70E740481C1C}">
                 <a14:useLocalDpi xmlns:a14="http://schemas.microsoft.com/office/drawing/2010/main" val="0"/>
@@ -13064,8 +11568,8 @@
         </p:blipFill>
         <p:spPr>
           <a:xfrm rot="0">
-            <a:off x="2668905" y="1454785"/>
-            <a:ext cx="2702560" cy="1148080"/>
+            <a:off x="1221105" y="4008755"/>
+            <a:ext cx="4139565" cy="1351280"/>
           </a:xfrm>
           <a:prstGeom prst="roundRect"/>
           <a:solidFill>
@@ -13075,14 +11579,14 @@
       </p:pic>
       <p:pic>
         <p:nvPicPr>
-          <p:cNvPr id="103" name="그림 12"/>
+          <p:cNvPr id="113" name="그림 42" descr="C:/Users/Admin1/AppData/Roaming/PolarisOffice/ETemp/9740_18728032/fImage99522484464.png"/>
           <p:cNvPicPr>
             <a:picLocks noChangeAspect="1"/>
           </p:cNvPicPr>
           <p:nvPr/>
         </p:nvPicPr>
         <p:blipFill rotWithShape="1">
-          <a:blip r:embed="rId4" cstate="hqprint">
+          <a:blip r:embed="rId5" cstate="hqprint">
             <a:extLst>
               <a:ext uri="{28A0092B-C50C-407E-A947-70E740481C1C}">
                 <a14:useLocalDpi xmlns:a14="http://schemas.microsoft.com/office/drawing/2010/main"/>
@@ -13094,38 +11598,9 @@
           </a:stretch>
         </p:blipFill>
         <p:spPr>
-          <a:xfrm rot="10800000">
-            <a:off x="2148205" y="1822450"/>
-            <a:ext cx="762000" cy="426085"/>
-          </a:xfrm>
-          <a:prstGeom prst="rect"/>
-          <a:noFill/>
-        </p:spPr>
-      </p:pic>
-      <p:pic>
-        <p:nvPicPr>
-          <p:cNvPr id="104" name="그림 13"/>
-          <p:cNvPicPr>
-            <a:picLocks noChangeAspect="1"/>
-          </p:cNvPicPr>
-          <p:nvPr/>
-        </p:nvPicPr>
-        <p:blipFill rotWithShape="1">
-          <a:blip r:embed="rId5" cstate="print">
-            <a:extLst>
-              <a:ext uri="{28A0092B-C50C-407E-A947-70E740481C1C}">
-                <a14:useLocalDpi xmlns:a14="http://schemas.microsoft.com/office/drawing/2010/main" val="0"/>
-              </a:ext>
-            </a:extLst>
-          </a:blip>
-          <a:stretch>
-            <a:fillRect/>
-          </a:stretch>
-        </p:blipFill>
-        <p:spPr>
-          <a:xfrm rot="0">
-            <a:off x="1230630" y="3832225"/>
-            <a:ext cx="4140200" cy="1544955"/>
+          <a:xfrm rot="0">
+            <a:off x="6806565" y="1446530"/>
+            <a:ext cx="1346835" cy="1271905"/>
           </a:xfrm>
           <a:prstGeom prst="roundRect"/>
           <a:solidFill>
@@ -13133,9 +11608,42 @@
           </a:solidFill>
         </p:spPr>
       </p:pic>
+      <p:cxnSp>
+        <p:nvCxnSpPr>
+          <p:cNvPr id="111" name="도형 37"/>
+          <p:cNvCxnSpPr/>
+          <p:nvPr/>
+        </p:nvCxnSpPr>
+        <p:spPr>
+          <a:xfrm rot="0" flipH="1">
+            <a:off x="7715250" y="2147570"/>
+            <a:ext cx="615950" cy="416560"/>
+          </a:xfrm>
+          <a:prstGeom prst="straightConnector1"/>
+          <a:ln w="6350" cap="flat" cmpd="sng">
+            <a:prstDash/>
+            <a:headEnd type="none" w="med" len="med"/>
+            <a:tailEnd type="triangle" w="med" len="med"/>
+          </a:ln>
+        </p:spPr>
+        <p:style>
+          <a:lnRef idx="1">
+            <a:schemeClr val="accent1"/>
+          </a:lnRef>
+          <a:fillRef idx="0">
+            <a:schemeClr val="accent1"/>
+          </a:fillRef>
+          <a:effectRef idx="0">
+            <a:schemeClr val="accent1"/>
+          </a:effectRef>
+          <a:fontRef idx="minor">
+            <a:schemeClr val="tx1"/>
+          </a:fontRef>
+        </p:style>
+      </p:cxnSp>
       <p:pic>
         <p:nvPicPr>
-          <p:cNvPr id="105" name="그림 16"/>
+          <p:cNvPr id="114" name="그림 46"/>
           <p:cNvPicPr>
             <a:picLocks noChangeAspect="1"/>
           </p:cNvPicPr>
@@ -13155,8 +11663,8 @@
         </p:blipFill>
         <p:spPr>
           <a:xfrm rot="0">
-            <a:off x="6816725" y="1446530"/>
-            <a:ext cx="2686050" cy="3308985"/>
+            <a:off x="8243570" y="4147820"/>
+            <a:ext cx="2710815" cy="1212850"/>
           </a:xfrm>
           <a:prstGeom prst="roundRect"/>
           <a:solidFill>
@@ -13166,7 +11674,7 @@
       </p:pic>
       <p:pic>
         <p:nvPicPr>
-          <p:cNvPr id="106" name="그림 19"/>
+          <p:cNvPr id="115" name="그림 49"/>
           <p:cNvPicPr>
             <a:picLocks noChangeAspect="1"/>
           </p:cNvPicPr>
@@ -13186,8 +11694,8 @@
         </p:blipFill>
         <p:spPr>
           <a:xfrm rot="0">
-            <a:off x="9659620" y="2178685"/>
-            <a:ext cx="1281430" cy="2078990"/>
+            <a:off x="6797675" y="4147820"/>
+            <a:ext cx="1343025" cy="1216025"/>
           </a:xfrm>
           <a:prstGeom prst="roundRect"/>
           <a:solidFill>
@@ -13195,6 +11703,80 @@
           </a:solidFill>
         </p:spPr>
       </p:pic>
+      <p:sp>
+        <p:nvSpPr>
+          <p:cNvPr id="116" name="텍스트 상자 50"/>
+          <p:cNvSpPr txBox="1">
+            <a:spLocks/>
+          </p:cNvSpPr>
+          <p:nvPr/>
+        </p:nvSpPr>
+        <p:spPr>
+          <a:xfrm>
+            <a:off x="6800215" y="5477510"/>
+            <a:ext cx="4154805" cy="677545"/>
+          </a:xfrm>
+          <a:prstGeom prst="rect"/>
+          <a:noFill/>
+          <a:ln w="0">
+            <a:noFill/>
+            <a:prstDash/>
+          </a:ln>
+        </p:spPr>
+        <p:txBody>
+          <a:bodyPr wrap="square" lIns="89535" tIns="46355" rIns="89535" bIns="46355" numCol="1" vert="horz" anchor="t">
+            <a:spAutoFit/>
+          </a:bodyPr>
+          <a:lstStyle/>
+          <a:p>
+            <a:pPr marL="0" indent="0" rtl="0" algn="l" defTabSz="914400" eaLnBrk="1" latinLnBrk="0" hangingPunct="1">
+              <a:buFontTx/>
+              <a:buNone/>
+            </a:pPr>
+            <a:r>
+              <a:rPr lang="ko-KR" sz="2000" b="1">
+                <a:solidFill>
+                  <a:srgbClr val="0611F2"/>
+                </a:solidFill>
+                <a:latin typeface="맑은 고딕" charset="0"/>
+                <a:ea typeface="맑은 고딕" charset="0"/>
+              </a:rPr>
+              <a:t>2</a:t>
+            </a:r>
+            <a:r>
+              <a:rPr lang="ko-KR" sz="2000" b="1">
+                <a:solidFill>
+                  <a:srgbClr val="0611F2"/>
+                </a:solidFill>
+                <a:latin typeface="맑은 고딕" charset="0"/>
+                <a:ea typeface="맑은 고딕" charset="0"/>
+              </a:rPr>
+              <a:t>9</a:t>
+            </a:r>
+            <a:r>
+              <a:rPr sz="2000" b="1">
+                <a:solidFill>
+                  <a:srgbClr val="0611F2"/>
+                </a:solidFill>
+                <a:latin typeface="맑은 고딕" charset="0"/>
+                <a:ea typeface="맑은 고딕" charset="0"/>
+              </a:rPr>
+              <a:t>. </a:t>
+            </a:r>
+            <a:r>
+              <a:rPr lang="ko-KR" sz="1800">
+                <a:latin typeface="맑은 고딕" charset="0"/>
+                <a:ea typeface="맑은 고딕" charset="0"/>
+              </a:rPr>
+              <a:t>그다음 HD TV 오브젝트에 Sphere Collideer 컴포넌트를 추가합니다.</a:t>
+            </a:r>
+            <a:endParaRPr lang="ko-KR" altLang="en-US" sz="1800">
+              <a:latin typeface="맑은 고딕" charset="0"/>
+              <a:ea typeface="맑은 고딕" charset="0"/>
+            </a:endParaRPr>
+          </a:p>
+        </p:txBody>
+      </p:sp>
     </p:spTree>
   </p:cSld>
   <p:clrMapOvr>
@@ -13273,7 +11855,7 @@
                 <a:latin typeface="나눔바른고딕" charset="0"/>
                 <a:ea typeface="나눔바른고딕" charset="0"/>
               </a:rPr>
-              <a:t>아홉</a:t>
+              <a:t>열</a:t>
             </a:r>
             <a:r>
               <a:rPr lang="ko-KR" sz="2500" b="1">
@@ -13291,93 +11873,6 @@
               </a:solidFill>
               <a:latin typeface="나눔바른고딕" charset="0"/>
               <a:ea typeface="나눔바른고딕" charset="0"/>
-            </a:endParaRPr>
-          </a:p>
-        </p:txBody>
-      </p:sp>
-      <p:sp>
-        <p:nvSpPr>
-          <p:cNvPr id="84" name="Rect 0"/>
-          <p:cNvSpPr txBox="1">
-            <a:spLocks/>
-          </p:cNvSpPr>
-          <p:nvPr/>
-        </p:nvSpPr>
-        <p:spPr>
-          <a:xfrm>
-            <a:off x="1221105" y="5476875"/>
-            <a:ext cx="4142105" cy="677545"/>
-          </a:xfrm>
-          <a:prstGeom prst="rect"/>
-          <a:noFill/>
-          <a:ln w="0">
-            <a:noFill/>
-            <a:prstDash/>
-          </a:ln>
-        </p:spPr>
-        <p:txBody>
-          <a:bodyPr wrap="square" lIns="89535" tIns="46355" rIns="89535" bIns="46355" numCol="1" vert="horz" anchor="t">
-            <a:spAutoFit/>
-          </a:bodyPr>
-          <a:lstStyle/>
-          <a:p>
-            <a:pPr marL="0" indent="0" rtl="0" algn="l" defTabSz="914400" eaLnBrk="1" latinLnBrk="0" hangingPunct="1">
-              <a:buFontTx/>
-              <a:buNone/>
-            </a:pPr>
-            <a:r>
-              <a:rPr lang="ko-KR" sz="2000" b="1">
-                <a:solidFill>
-                  <a:srgbClr val="0611F2"/>
-                </a:solidFill>
-                <a:latin typeface="맑은 고딕" charset="0"/>
-                <a:ea typeface="맑은 고딕" charset="0"/>
-              </a:rPr>
-              <a:t>2</a:t>
-            </a:r>
-            <a:r>
-              <a:rPr lang="ko-KR" sz="2000" b="1">
-                <a:solidFill>
-                  <a:srgbClr val="0611F2"/>
-                </a:solidFill>
-                <a:latin typeface="맑은 고딕" charset="0"/>
-                <a:ea typeface="맑은 고딕" charset="0"/>
-              </a:rPr>
-              <a:t>7</a:t>
-            </a:r>
-            <a:r>
-              <a:rPr sz="2000" b="1">
-                <a:solidFill>
-                  <a:srgbClr val="0611F2"/>
-                </a:solidFill>
-                <a:latin typeface="맑은 고딕" charset="0"/>
-                <a:ea typeface="맑은 고딕" charset="0"/>
-              </a:rPr>
-              <a:t>. </a:t>
-            </a:r>
-            <a:r>
-              <a:rPr lang="ko-KR" sz="1800">
-                <a:latin typeface="맑은 고딕" charset="0"/>
-                <a:ea typeface="맑은 고딕" charset="0"/>
-              </a:rPr>
-              <a:t>그러고 나서 </a:t>
-            </a:r>
-            <a:r>
-              <a:rPr lang="ko-KR" sz="1800" b="0">
-                <a:solidFill>
-                  <a:schemeClr val="tx1"/>
-                </a:solidFill>
-                <a:latin typeface="맑은 고딕" charset="0"/>
-                <a:ea typeface="맑은 고딕" charset="0"/>
-              </a:rPr>
-              <a:t>Screen 오브젝트의 Video Player 컴포넌트를 추가합니다.</a:t>
-            </a:r>
-            <a:endParaRPr lang="ko-KR" altLang="en-US" sz="1800" b="0">
-              <a:solidFill>
-                <a:schemeClr val="tx1"/>
-              </a:solidFill>
-              <a:latin typeface="맑은 고딕" charset="0"/>
-              <a:ea typeface="맑은 고딕" charset="0"/>
             </a:endParaRPr>
           </a:p>
         </p:txBody>
@@ -13391,9 +11886,9 @@
           <p:nvPr/>
         </p:nvSpPr>
         <p:spPr>
-          <a:xfrm rot="0">
-            <a:off x="6797675" y="2806700"/>
-            <a:ext cx="4157345" cy="1231265"/>
+          <a:xfrm>
+            <a:off x="1238885" y="3859530"/>
+            <a:ext cx="4140200" cy="2338705"/>
           </a:xfrm>
           <a:prstGeom prst="rect"/>
           <a:noFill/>
@@ -13420,26 +11915,16 @@
                 <a:latin typeface="맑은 고딕" charset="0"/>
                 <a:ea typeface="맑은 고딕" charset="0"/>
               </a:rPr>
-              <a:t>2</a:t>
-            </a:r>
-            <a:r>
-              <a:rPr lang="ko-KR" sz="2000" b="1">
+              <a:t>30</a:t>
+            </a:r>
+            <a:r>
+              <a:rPr sz="2000" b="1">
                 <a:solidFill>
                   <a:srgbClr val="0611F2"/>
                 </a:solidFill>
                 <a:latin typeface="맑은 고딕" charset="0"/>
                 <a:ea typeface="맑은 고딕" charset="0"/>
               </a:rPr>
-              <a:t>8</a:t>
-            </a:r>
-            <a:r>
-              <a:rPr sz="2000" b="1">
-                <a:solidFill>
-                  <a:srgbClr val="0611F2"/>
-                </a:solidFill>
-                <a:latin typeface="맑은 고딕" charset="0"/>
-                <a:ea typeface="맑은 고딕" charset="0"/>
-              </a:rPr>
               <a:t>. </a:t>
             </a:r>
             <a:r>
@@ -13447,18 +11932,45 @@
                 <a:latin typeface="맑은 고딕" charset="0"/>
                 <a:ea typeface="맑은 고딕" charset="0"/>
               </a:rPr>
-              <a:t>이제 Project 폴더 아래에 있는 Video Player 폴더에 Game Video를 선택한 다음 Screen 오브젝트에 넣어줍니다.</a:t>
+              <a:t>그런 다음 Mouse 스크립트에서 Rigidbody 변수와 GameObject 변수 그리고 VideoPlayer 변수를 선언합니다.</a:t>
             </a:r>
             <a:endParaRPr lang="ko-KR" altLang="en-US" sz="1800">
               <a:latin typeface="맑은 고딕" charset="0"/>
               <a:ea typeface="맑은 고딕" charset="0"/>
             </a:endParaRPr>
           </a:p>
+          <a:p>
+            <a:pPr marL="0" indent="0" rtl="0" algn="l" defTabSz="914400" eaLnBrk="1" latinLnBrk="0" hangingPunct="1">
+              <a:buFontTx/>
+              <a:buNone/>
+            </a:pPr>
+            <a:endParaRPr lang="ko-KR" altLang="en-US" sz="1800">
+              <a:latin typeface="맑은 고딕" charset="0"/>
+              <a:ea typeface="맑은 고딕" charset="0"/>
+            </a:endParaRPr>
+          </a:p>
+          <a:p>
+            <a:pPr marL="0" indent="0" rtl="0" algn="l" defTabSz="914400" eaLnBrk="1" latinLnBrk="0" hangingPunct="1">
+              <a:buFontTx/>
+              <a:buNone/>
+            </a:pPr>
+            <a:r>
+              <a:rPr lang="ko-KR" sz="1800">
+                <a:latin typeface="맑은 고딕" charset="0"/>
+                <a:ea typeface="맑은 고딕" charset="0"/>
+              </a:rPr>
+              <a:t>그러고 나서 LayerMask 변수와 RaycastHit 변수 그리고 boolean 변수를 선언합니다.</a:t>
+            </a:r>
+            <a:endParaRPr lang="ko-KR" altLang="en-US" sz="1800">
+              <a:latin typeface="맑은 고딕" charset="0"/>
+              <a:ea typeface="맑은 고딕" charset="0"/>
+            </a:endParaRPr>
+          </a:p>
         </p:txBody>
       </p:sp>
       <p:sp>
         <p:nvSpPr>
-          <p:cNvPr id="94" name="Rect 0"/>
+          <p:cNvPr id="94" name="텍스트 상자 58"/>
           <p:cNvSpPr txBox="1">
             <a:spLocks/>
           </p:cNvSpPr>
@@ -13466,8 +11978,8 @@
         </p:nvSpPr>
         <p:spPr>
           <a:xfrm>
-            <a:off x="1223645" y="3194050"/>
-            <a:ext cx="4147820" cy="677545"/>
+            <a:off x="6814820" y="3861435"/>
+            <a:ext cx="4131945" cy="2338705"/>
           </a:xfrm>
           <a:prstGeom prst="rect"/>
           <a:noFill/>
@@ -13494,26 +12006,16 @@
                 <a:latin typeface="맑은 고딕" charset="0"/>
                 <a:ea typeface="맑은 고딕" charset="0"/>
               </a:rPr>
-              <a:t>2</a:t>
-            </a:r>
-            <a:r>
-              <a:rPr lang="ko-KR" sz="2000" b="1">
+              <a:t>31</a:t>
+            </a:r>
+            <a:r>
+              <a:rPr sz="2000" b="1">
                 <a:solidFill>
                   <a:srgbClr val="0611F2"/>
                 </a:solidFill>
                 <a:latin typeface="맑은 고딕" charset="0"/>
                 <a:ea typeface="맑은 고딕" charset="0"/>
               </a:rPr>
-              <a:t>6</a:t>
-            </a:r>
-            <a:r>
-              <a:rPr sz="2000" b="1">
-                <a:solidFill>
-                  <a:srgbClr val="0611F2"/>
-                </a:solidFill>
-                <a:latin typeface="맑은 고딕" charset="0"/>
-                <a:ea typeface="맑은 고딕" charset="0"/>
-              </a:rPr>
               <a:t>. </a:t>
             </a:r>
             <a:r>
@@ -13521,18 +12023,45 @@
                 <a:latin typeface="맑은 고딕" charset="0"/>
                 <a:ea typeface="맑은 고딕" charset="0"/>
               </a:rPr>
-              <a:t>그다음 Screen 오브젝트의 위치와 회전 그리고 크기 값을 설정합니다.</a:t>
+              <a:t>이제 Update( ) 함수에서 ray에 대한 정보를 설정한 다음 마우스로 선택했을 때 ray와 특정한 layer를 가진 오브젝트가 충돌했는지 검사합니다.</a:t>
             </a:r>
             <a:endParaRPr lang="ko-KR" altLang="en-US" sz="1800">
               <a:latin typeface="맑은 고딕" charset="0"/>
               <a:ea typeface="맑은 고딕" charset="0"/>
             </a:endParaRPr>
           </a:p>
+          <a:p>
+            <a:pPr marL="0" indent="0" rtl="0" algn="l" defTabSz="914400" eaLnBrk="1" latinLnBrk="0" hangingPunct="1">
+              <a:buFontTx/>
+              <a:buNone/>
+            </a:pPr>
+            <a:endParaRPr lang="ko-KR" altLang="en-US" sz="1800">
+              <a:latin typeface="맑은 고딕" charset="0"/>
+              <a:ea typeface="맑은 고딕" charset="0"/>
+            </a:endParaRPr>
+          </a:p>
+          <a:p>
+            <a:pPr marL="0" indent="0" rtl="0" algn="l" defTabSz="914400" eaLnBrk="1" latinLnBrk="0" hangingPunct="1">
+              <a:buFontTx/>
+              <a:buNone/>
+            </a:pPr>
+            <a:r>
+              <a:rPr lang="ko-KR" sz="1800">
+                <a:latin typeface="맑은 고딕" charset="0"/>
+                <a:ea typeface="맑은 고딕" charset="0"/>
+              </a:rPr>
+              <a:t>그다음 충돌이 되었다면 boolean 변수에 따라 video를 실행하고 정지할 수 있도록 설정합니다.</a:t>
+            </a:r>
+            <a:endParaRPr lang="ko-KR" altLang="en-US" sz="1800">
+              <a:latin typeface="맑은 고딕" charset="0"/>
+              <a:ea typeface="맑은 고딕" charset="0"/>
+            </a:endParaRPr>
+          </a:p>
         </p:txBody>
       </p:sp>
       <p:pic>
         <p:nvPicPr>
-          <p:cNvPr id="108" name="그림 30"/>
+          <p:cNvPr id="96" name="그림 62"/>
           <p:cNvPicPr>
             <a:picLocks noChangeAspect="1"/>
           </p:cNvPicPr>
@@ -13552,8 +12081,8 @@
         </p:blipFill>
         <p:spPr>
           <a:xfrm rot="0">
-            <a:off x="1229995" y="1438275"/>
-            <a:ext cx="4132580" cy="1662430"/>
+            <a:off x="1235710" y="1437640"/>
+            <a:ext cx="4142740" cy="2312670"/>
           </a:xfrm>
           <a:prstGeom prst="roundRect"/>
           <a:solidFill>
@@ -13563,45 +12092,14 @@
       </p:pic>
       <p:pic>
         <p:nvPicPr>
-          <p:cNvPr id="109" name="그림 33" descr="C:/Users/Admin1/AppData/Roaming/PolarisOffice/ETemp/9740_18728032/fImage101942369358.png"/>
+          <p:cNvPr id="97" name="그림 65"/>
           <p:cNvPicPr>
             <a:picLocks noChangeAspect="1"/>
           </p:cNvPicPr>
           <p:nvPr/>
         </p:nvPicPr>
         <p:blipFill rotWithShape="1">
-          <a:blip r:embed="rId3" cstate="hqprint">
-            <a:extLst>
-              <a:ext uri="{28A0092B-C50C-407E-A947-70E740481C1C}">
-                <a14:useLocalDpi xmlns:a14="http://schemas.microsoft.com/office/drawing/2010/main"/>
-              </a:ext>
-            </a:extLst>
-          </a:blip>
-          <a:stretch>
-            <a:fillRect/>
-          </a:stretch>
-        </p:blipFill>
-        <p:spPr>
-          <a:xfrm rot="0">
-            <a:off x="8239125" y="1446530"/>
-            <a:ext cx="2709545" cy="1264285"/>
-          </a:xfrm>
-          <a:prstGeom prst="roundRect"/>
-          <a:solidFill>
-            <a:srgbClr val="EDEDED"/>
-          </a:solidFill>
-        </p:spPr>
-      </p:pic>
-      <p:pic>
-        <p:nvPicPr>
-          <p:cNvPr id="112" name="그림 38"/>
-          <p:cNvPicPr>
-            <a:picLocks noChangeAspect="1"/>
-          </p:cNvPicPr>
-          <p:nvPr/>
-        </p:nvPicPr>
-        <p:blipFill rotWithShape="1">
-          <a:blip r:embed="rId4" cstate="print">
+          <a:blip r:embed="rId3" cstate="print">
             <a:extLst>
               <a:ext uri="{28A0092B-C50C-407E-A947-70E740481C1C}">
                 <a14:useLocalDpi xmlns:a14="http://schemas.microsoft.com/office/drawing/2010/main" val="0"/>
@@ -13614,8 +12112,8 @@
         </p:blipFill>
         <p:spPr>
           <a:xfrm rot="0">
-            <a:off x="1221105" y="4008755"/>
-            <a:ext cx="4139565" cy="1351280"/>
+            <a:off x="6814820" y="1437640"/>
+            <a:ext cx="4139565" cy="2312670"/>
           </a:xfrm>
           <a:prstGeom prst="roundRect"/>
           <a:solidFill>
@@ -13623,206 +12121,6 @@
           </a:solidFill>
         </p:spPr>
       </p:pic>
-      <p:pic>
-        <p:nvPicPr>
-          <p:cNvPr id="113" name="그림 42" descr="C:/Users/Admin1/AppData/Roaming/PolarisOffice/ETemp/9740_18728032/fImage99522484464.png"/>
-          <p:cNvPicPr>
-            <a:picLocks noChangeAspect="1"/>
-          </p:cNvPicPr>
-          <p:nvPr/>
-        </p:nvPicPr>
-        <p:blipFill rotWithShape="1">
-          <a:blip r:embed="rId5" cstate="hqprint">
-            <a:extLst>
-              <a:ext uri="{28A0092B-C50C-407E-A947-70E740481C1C}">
-                <a14:useLocalDpi xmlns:a14="http://schemas.microsoft.com/office/drawing/2010/main"/>
-              </a:ext>
-            </a:extLst>
-          </a:blip>
-          <a:stretch>
-            <a:fillRect/>
-          </a:stretch>
-        </p:blipFill>
-        <p:spPr>
-          <a:xfrm rot="0">
-            <a:off x="6806565" y="1446530"/>
-            <a:ext cx="1346835" cy="1271905"/>
-          </a:xfrm>
-          <a:prstGeom prst="roundRect"/>
-          <a:solidFill>
-            <a:srgbClr val="EDEDED"/>
-          </a:solidFill>
-        </p:spPr>
-      </p:pic>
-      <p:cxnSp>
-        <p:nvCxnSpPr>
-          <p:cNvPr id="111" name="도형 37"/>
-          <p:cNvCxnSpPr/>
-          <p:nvPr/>
-        </p:nvCxnSpPr>
-        <p:spPr>
-          <a:xfrm rot="0" flipH="1">
-            <a:off x="7715250" y="2147570"/>
-            <a:ext cx="615950" cy="416560"/>
-          </a:xfrm>
-          <a:prstGeom prst="straightConnector1"/>
-          <a:ln w="6350" cap="flat" cmpd="sng">
-            <a:prstDash/>
-            <a:headEnd type="none" w="med" len="med"/>
-            <a:tailEnd type="triangle" w="med" len="med"/>
-          </a:ln>
-        </p:spPr>
-        <p:style>
-          <a:lnRef idx="1">
-            <a:schemeClr val="accent1"/>
-          </a:lnRef>
-          <a:fillRef idx="0">
-            <a:schemeClr val="accent1"/>
-          </a:fillRef>
-          <a:effectRef idx="0">
-            <a:schemeClr val="accent1"/>
-          </a:effectRef>
-          <a:fontRef idx="minor">
-            <a:schemeClr val="tx1"/>
-          </a:fontRef>
-        </p:style>
-      </p:cxnSp>
-      <p:pic>
-        <p:nvPicPr>
-          <p:cNvPr id="114" name="그림 46"/>
-          <p:cNvPicPr>
-            <a:picLocks noChangeAspect="1"/>
-          </p:cNvPicPr>
-          <p:nvPr/>
-        </p:nvPicPr>
-        <p:blipFill rotWithShape="1">
-          <a:blip r:embed="rId6" cstate="print">
-            <a:extLst>
-              <a:ext uri="{28A0092B-C50C-407E-A947-70E740481C1C}">
-                <a14:useLocalDpi xmlns:a14="http://schemas.microsoft.com/office/drawing/2010/main" val="0"/>
-              </a:ext>
-            </a:extLst>
-          </a:blip>
-          <a:stretch>
-            <a:fillRect/>
-          </a:stretch>
-        </p:blipFill>
-        <p:spPr>
-          <a:xfrm rot="0">
-            <a:off x="8243570" y="4147820"/>
-            <a:ext cx="2710815" cy="1212850"/>
-          </a:xfrm>
-          <a:prstGeom prst="roundRect"/>
-          <a:solidFill>
-            <a:srgbClr val="EDEDED"/>
-          </a:solidFill>
-        </p:spPr>
-      </p:pic>
-      <p:pic>
-        <p:nvPicPr>
-          <p:cNvPr id="115" name="그림 49"/>
-          <p:cNvPicPr>
-            <a:picLocks noChangeAspect="1"/>
-          </p:cNvPicPr>
-          <p:nvPr/>
-        </p:nvPicPr>
-        <p:blipFill rotWithShape="1">
-          <a:blip r:embed="rId7" cstate="print">
-            <a:extLst>
-              <a:ext uri="{28A0092B-C50C-407E-A947-70E740481C1C}">
-                <a14:useLocalDpi xmlns:a14="http://schemas.microsoft.com/office/drawing/2010/main" val="0"/>
-              </a:ext>
-            </a:extLst>
-          </a:blip>
-          <a:stretch>
-            <a:fillRect/>
-          </a:stretch>
-        </p:blipFill>
-        <p:spPr>
-          <a:xfrm rot="0">
-            <a:off x="6797675" y="4147820"/>
-            <a:ext cx="1343025" cy="1216025"/>
-          </a:xfrm>
-          <a:prstGeom prst="roundRect"/>
-          <a:solidFill>
-            <a:srgbClr val="EDEDED"/>
-          </a:solidFill>
-        </p:spPr>
-      </p:pic>
-      <p:sp>
-        <p:nvSpPr>
-          <p:cNvPr id="116" name="텍스트 상자 50"/>
-          <p:cNvSpPr txBox="1">
-            <a:spLocks/>
-          </p:cNvSpPr>
-          <p:nvPr/>
-        </p:nvSpPr>
-        <p:spPr>
-          <a:xfrm>
-            <a:off x="6800215" y="5477510"/>
-            <a:ext cx="4154805" cy="677545"/>
-          </a:xfrm>
-          <a:prstGeom prst="rect"/>
-          <a:noFill/>
-          <a:ln w="0">
-            <a:noFill/>
-            <a:prstDash/>
-          </a:ln>
-        </p:spPr>
-        <p:txBody>
-          <a:bodyPr wrap="square" lIns="89535" tIns="46355" rIns="89535" bIns="46355" numCol="1" vert="horz" anchor="t">
-            <a:spAutoFit/>
-          </a:bodyPr>
-          <a:lstStyle/>
-          <a:p>
-            <a:pPr marL="0" indent="0" rtl="0" algn="l" defTabSz="914400" eaLnBrk="1" latinLnBrk="0" hangingPunct="1">
-              <a:buFontTx/>
-              <a:buNone/>
-            </a:pPr>
-            <a:r>
-              <a:rPr lang="ko-KR" sz="2000" b="1">
-                <a:solidFill>
-                  <a:srgbClr val="0611F2"/>
-                </a:solidFill>
-                <a:latin typeface="맑은 고딕" charset="0"/>
-                <a:ea typeface="맑은 고딕" charset="0"/>
-              </a:rPr>
-              <a:t>2</a:t>
-            </a:r>
-            <a:r>
-              <a:rPr lang="ko-KR" sz="2000" b="1">
-                <a:solidFill>
-                  <a:srgbClr val="0611F2"/>
-                </a:solidFill>
-                <a:latin typeface="맑은 고딕" charset="0"/>
-                <a:ea typeface="맑은 고딕" charset="0"/>
-              </a:rPr>
-              <a:t>9</a:t>
-            </a:r>
-            <a:r>
-              <a:rPr sz="2000" b="1">
-                <a:solidFill>
-                  <a:srgbClr val="0611F2"/>
-                </a:solidFill>
-                <a:latin typeface="맑은 고딕" charset="0"/>
-                <a:ea typeface="맑은 고딕" charset="0"/>
-              </a:rPr>
-              <a:t>. </a:t>
-            </a:r>
-            <a:r>
-              <a:rPr lang="ko-KR" sz="1800">
-                <a:latin typeface="맑은 고딕" charset="0"/>
-                <a:ea typeface="맑은 고딕" charset="0"/>
-              </a:rPr>
-              <a:t>그다음 HD TV 오브젝트에 Sphere Collideer 컴포넌트를 추가합니다.</a:t>
-            </a:r>
-            <a:endParaRPr lang="ko-KR" altLang="en-US" sz="1800">
-              <a:latin typeface="맑은 고딕" charset="0"/>
-              <a:ea typeface="맑은 고딕" charset="0"/>
-            </a:endParaRPr>
-          </a:p>
-        </p:txBody>
-      </p:sp>
     </p:spTree>
   </p:cSld>
   <p:clrMapOvr>

</xml_diff>